<commit_message>
Changed drawio and power point
</commit_message>
<xml_diff>
--- a/Presentazione Progetto OS161.pptx
+++ b/Presentazione Progetto OS161.pptx
@@ -5,7 +5,7 @@
     <p:sldMasterId id="2147483940" r:id="rId1"/>
   </p:sldMasterIdLst>
   <p:notesMasterIdLst>
-    <p:notesMasterId r:id="rId52"/>
+    <p:notesMasterId r:id="rId59"/>
   </p:notesMasterIdLst>
   <p:sldIdLst>
     <p:sldId id="256" r:id="rId2"/>
@@ -43,21 +43,28 @@
     <p:sldId id="280" r:id="rId34"/>
     <p:sldId id="281" r:id="rId35"/>
     <p:sldId id="282" r:id="rId36"/>
-    <p:sldId id="283" r:id="rId37"/>
-    <p:sldId id="284" r:id="rId38"/>
-    <p:sldId id="304" r:id="rId39"/>
-    <p:sldId id="285" r:id="rId40"/>
-    <p:sldId id="286" r:id="rId41"/>
-    <p:sldId id="264" r:id="rId42"/>
-    <p:sldId id="287" r:id="rId43"/>
-    <p:sldId id="265" r:id="rId44"/>
-    <p:sldId id="288" r:id="rId45"/>
-    <p:sldId id="295" r:id="rId46"/>
-    <p:sldId id="294" r:id="rId47"/>
-    <p:sldId id="291" r:id="rId48"/>
-    <p:sldId id="292" r:id="rId49"/>
-    <p:sldId id="289" r:id="rId50"/>
-    <p:sldId id="290" r:id="rId51"/>
+    <p:sldId id="310" r:id="rId37"/>
+    <p:sldId id="315" r:id="rId38"/>
+    <p:sldId id="311" r:id="rId39"/>
+    <p:sldId id="312" r:id="rId40"/>
+    <p:sldId id="313" r:id="rId41"/>
+    <p:sldId id="314" r:id="rId42"/>
+    <p:sldId id="316" r:id="rId43"/>
+    <p:sldId id="283" r:id="rId44"/>
+    <p:sldId id="284" r:id="rId45"/>
+    <p:sldId id="304" r:id="rId46"/>
+    <p:sldId id="285" r:id="rId47"/>
+    <p:sldId id="286" r:id="rId48"/>
+    <p:sldId id="264" r:id="rId49"/>
+    <p:sldId id="287" r:id="rId50"/>
+    <p:sldId id="265" r:id="rId51"/>
+    <p:sldId id="288" r:id="rId52"/>
+    <p:sldId id="295" r:id="rId53"/>
+    <p:sldId id="294" r:id="rId54"/>
+    <p:sldId id="291" r:id="rId55"/>
+    <p:sldId id="292" r:id="rId56"/>
+    <p:sldId id="289" r:id="rId57"/>
+    <p:sldId id="290" r:id="rId58"/>
   </p:sldIdLst>
   <p:sldSz cx="12192000" cy="6858000"/>
   <p:notesSz cx="6858000" cy="9144000"/>
@@ -701,7 +708,7 @@
           <a:p>
             <a:fld id="{3E8D6972-3784-6B4C-B9F3-068AC136E076}" type="datetimeFigureOut">
               <a:rPr lang="it-IT" smtClean="0"/>
-              <a:t>30/03/2023</a:t>
+              <a:t>04/04/2023</a:t>
             </a:fld>
             <a:endParaRPr lang="it-IT"/>
           </a:p>
@@ -1369,7 +1376,7 @@
           <a:p>
             <a:fld id="{C8D41A6A-C987-6C42-BA4E-4CB2821A3A64}" type="slidenum">
               <a:rPr lang="it-IT" smtClean="0"/>
-              <a:t>44</a:t>
+              <a:t>51</a:t>
             </a:fld>
             <a:endParaRPr lang="it-IT"/>
           </a:p>
@@ -1453,7 +1460,7 @@
           <a:p>
             <a:fld id="{C8D41A6A-C987-6C42-BA4E-4CB2821A3A64}" type="slidenum">
               <a:rPr lang="it-IT" smtClean="0"/>
-              <a:t>45</a:t>
+              <a:t>52</a:t>
             </a:fld>
             <a:endParaRPr lang="it-IT"/>
           </a:p>
@@ -1537,7 +1544,7 @@
           <a:p>
             <a:fld id="{C8D41A6A-C987-6C42-BA4E-4CB2821A3A64}" type="slidenum">
               <a:rPr lang="it-IT" smtClean="0"/>
-              <a:t>46</a:t>
+              <a:t>53</a:t>
             </a:fld>
             <a:endParaRPr lang="it-IT"/>
           </a:p>
@@ -1621,7 +1628,7 @@
           <a:p>
             <a:fld id="{C8D41A6A-C987-6C42-BA4E-4CB2821A3A64}" type="slidenum">
               <a:rPr lang="it-IT" smtClean="0"/>
-              <a:t>49</a:t>
+              <a:t>56</a:t>
             </a:fld>
             <a:endParaRPr lang="it-IT"/>
           </a:p>
@@ -1955,7 +1962,7 @@
             <a:fld id="{73C3BD54-29B9-3D42-B178-776ED395AA85}" type="datetimeFigureOut">
               <a:rPr lang="en-US" smtClean="0"/>
               <a:pPr/>
-              <a:t>3/30/2023</a:t>
+              <a:t>4/4/2023</a:t>
             </a:fld>
             <a:endParaRPr lang="en-US" sz="1400"/>
           </a:p>
@@ -2205,7 +2212,7 @@
           <a:p>
             <a:fld id="{73C3BD54-29B9-3D42-B178-776ED395AA85}" type="datetimeFigureOut">
               <a:rPr lang="en-US" smtClean="0"/>
-              <a:t>3/30/2023</a:t>
+              <a:t>4/4/2023</a:t>
             </a:fld>
             <a:endParaRPr lang="en-US"/>
           </a:p>
@@ -2519,7 +2526,7 @@
           <a:p>
             <a:fld id="{73C3BD54-29B9-3D42-B178-776ED395AA85}" type="datetimeFigureOut">
               <a:rPr lang="en-US" smtClean="0"/>
-              <a:t>3/30/2023</a:t>
+              <a:t>4/4/2023</a:t>
             </a:fld>
             <a:endParaRPr lang="en-US"/>
           </a:p>
@@ -3033,7 +3040,7 @@
           <a:p>
             <a:fld id="{73C3BD54-29B9-3D42-B178-776ED395AA85}" type="datetimeFigureOut">
               <a:rPr lang="en-US" smtClean="0"/>
-              <a:t>3/30/2023</a:t>
+              <a:t>4/4/2023</a:t>
             </a:fld>
             <a:endParaRPr lang="en-US"/>
           </a:p>
@@ -3464,7 +3471,7 @@
           <a:p>
             <a:fld id="{73C3BD54-29B9-3D42-B178-776ED395AA85}" type="datetimeFigureOut">
               <a:rPr lang="en-US" smtClean="0"/>
-              <a:t>3/30/2023</a:t>
+              <a:t>4/4/2023</a:t>
             </a:fld>
             <a:endParaRPr lang="en-US"/>
           </a:p>
@@ -3729,7 +3736,7 @@
           <a:p>
             <a:fld id="{73C3BD54-29B9-3D42-B178-776ED395AA85}" type="datetimeFigureOut">
               <a:rPr lang="en-US" smtClean="0"/>
-              <a:t>3/30/2023</a:t>
+              <a:t>4/4/2023</a:t>
             </a:fld>
             <a:endParaRPr lang="en-US"/>
           </a:p>
@@ -4303,7 +4310,7 @@
           <a:p>
             <a:fld id="{73C3BD54-29B9-3D42-B178-776ED395AA85}" type="datetimeFigureOut">
               <a:rPr lang="en-US" smtClean="0"/>
-              <a:t>3/30/2023</a:t>
+              <a:t>4/4/2023</a:t>
             </a:fld>
             <a:endParaRPr lang="en-US"/>
           </a:p>
@@ -4606,7 +4613,7 @@
           <a:p>
             <a:fld id="{73C3BD54-29B9-3D42-B178-776ED395AA85}" type="datetimeFigureOut">
               <a:rPr lang="en-US" smtClean="0"/>
-              <a:t>3/30/2023</a:t>
+              <a:t>4/4/2023</a:t>
             </a:fld>
             <a:endParaRPr lang="en-US"/>
           </a:p>
@@ -4881,7 +4888,7 @@
           <a:p>
             <a:fld id="{73C3BD54-29B9-3D42-B178-776ED395AA85}" type="datetimeFigureOut">
               <a:rPr lang="en-US" smtClean="0"/>
-              <a:t>3/30/2023</a:t>
+              <a:t>4/4/2023</a:t>
             </a:fld>
             <a:endParaRPr lang="en-US"/>
           </a:p>
@@ -5352,7 +5359,7 @@
           <a:p>
             <a:fld id="{73C3BD54-29B9-3D42-B178-776ED395AA85}" type="datetimeFigureOut">
               <a:rPr lang="en-US" smtClean="0"/>
-              <a:t>3/30/2023</a:t>
+              <a:t>4/4/2023</a:t>
             </a:fld>
             <a:endParaRPr lang="en-US"/>
           </a:p>
@@ -5803,7 +5810,7 @@
           <a:p>
             <a:fld id="{73C3BD54-29B9-3D42-B178-776ED395AA85}" type="datetimeFigureOut">
               <a:rPr lang="en-US" smtClean="0"/>
-              <a:t>3/30/2023</a:t>
+              <a:t>4/4/2023</a:t>
             </a:fld>
             <a:endParaRPr lang="en-US"/>
           </a:p>
@@ -6202,7 +6209,7 @@
             <a:fld id="{73C3BD54-29B9-3D42-B178-776ED395AA85}" type="datetimeFigureOut">
               <a:rPr lang="en-US" smtClean="0"/>
               <a:pPr/>
-              <a:t>3/30/2023</a:t>
+              <a:t>4/4/2023</a:t>
             </a:fld>
             <a:endParaRPr lang="en-US" dirty="0"/>
           </a:p>
@@ -14988,19 +14995,19 @@
         </p:nvSpPr>
         <p:spPr>
           <a:xfrm>
-            <a:off x="9007686" y="203706"/>
-            <a:ext cx="2772636" cy="1446550"/>
+            <a:off x="7962314" y="203706"/>
+            <a:ext cx="3874258" cy="710694"/>
           </a:xfrm>
         </p:spPr>
         <p:txBody>
           <a:bodyPr>
-            <a:normAutofit/>
+            <a:normAutofit fontScale="90000"/>
           </a:bodyPr>
           <a:lstStyle/>
           <a:p>
             <a:r>
               <a:rPr lang="it-IT" sz="3600" dirty="0"/>
-              <a:t>VM Fault 3/4</a:t>
+              <a:t>  Load frame from ELF</a:t>
             </a:r>
             <a:br>
               <a:rPr lang="it-IT" sz="4400" dirty="0"/>
@@ -15084,10 +15091,10 @@
       </p:pic>
       <p:pic>
         <p:nvPicPr>
-          <p:cNvPr id="4" name="Immagine 3">
-            <a:extLst>
-              <a:ext uri="{FF2B5EF4-FFF2-40B4-BE49-F238E27FC236}">
-                <a16:creationId xmlns:a16="http://schemas.microsoft.com/office/drawing/2014/main" id="{E73C62F4-9A61-E1AA-B7CD-F71B3DAE018C}"/>
+          <p:cNvPr id="7" name="Immagine 6" descr="Immagine che contiene diagramma&#10;&#10;Descrizione generata automaticamente">
+            <a:extLst>
+              <a:ext uri="{FF2B5EF4-FFF2-40B4-BE49-F238E27FC236}">
+                <a16:creationId xmlns:a16="http://schemas.microsoft.com/office/drawing/2014/main" id="{770B2836-2165-89DA-20B0-0BF780EFDFAD}"/>
               </a:ext>
             </a:extLst>
           </p:cNvPr>
@@ -15096,46 +15103,15 @@
           </p:cNvPicPr>
           <p:nvPr/>
         </p:nvPicPr>
-        <p:blipFill>
+        <p:blipFill rotWithShape="1">
           <a:blip r:embed="rId3"/>
-          <a:stretch>
-            <a:fillRect/>
-          </a:stretch>
+          <a:srcRect b="36701"/>
+          <a:stretch/>
         </p:blipFill>
         <p:spPr>
           <a:xfrm>
-            <a:off x="1595251" y="1625095"/>
-            <a:ext cx="9413175" cy="4881491"/>
-          </a:xfrm>
-          <a:prstGeom prst="rect">
-            <a:avLst/>
-          </a:prstGeom>
-        </p:spPr>
-      </p:pic>
-      <p:pic>
-        <p:nvPicPr>
-          <p:cNvPr id="3" name="Immagine 2">
-            <a:extLst>
-              <a:ext uri="{FF2B5EF4-FFF2-40B4-BE49-F238E27FC236}">
-                <a16:creationId xmlns:a16="http://schemas.microsoft.com/office/drawing/2014/main" id="{2D4A5EA6-3100-B00D-221E-B65B14126882}"/>
-              </a:ext>
-            </a:extLst>
-          </p:cNvPr>
-          <p:cNvPicPr>
-            <a:picLocks noChangeAspect="1"/>
-          </p:cNvPicPr>
-          <p:nvPr/>
-        </p:nvPicPr>
-        <p:blipFill>
-          <a:blip r:embed="rId4"/>
-          <a:stretch>
-            <a:fillRect/>
-          </a:stretch>
-        </p:blipFill>
-        <p:spPr>
-          <a:xfrm>
-            <a:off x="5531483" y="5664595"/>
-            <a:ext cx="1224159" cy="912932"/>
+            <a:off x="819663" y="1287039"/>
+            <a:ext cx="9660768" cy="4584261"/>
           </a:xfrm>
           <a:prstGeom prst="rect">
             <a:avLst/>
@@ -15145,7 +15121,7 @@
     </p:spTree>
     <p:extLst>
       <p:ext uri="{BB962C8B-B14F-4D97-AF65-F5344CB8AC3E}">
-        <p14:creationId xmlns:p14="http://schemas.microsoft.com/office/powerpoint/2010/main" val="4289977724"/>
+        <p14:creationId xmlns:p14="http://schemas.microsoft.com/office/powerpoint/2010/main" val="1330358197"/>
       </p:ext>
     </p:extLst>
   </p:cSld>
@@ -15190,19 +15166,19 @@
         </p:nvSpPr>
         <p:spPr>
           <a:xfrm>
-            <a:off x="8502555" y="203706"/>
-            <a:ext cx="3277767" cy="1446550"/>
+            <a:off x="7962314" y="203706"/>
+            <a:ext cx="3874258" cy="710694"/>
           </a:xfrm>
         </p:spPr>
         <p:txBody>
           <a:bodyPr>
-            <a:normAutofit/>
+            <a:normAutofit fontScale="90000"/>
           </a:bodyPr>
           <a:lstStyle/>
           <a:p>
             <a:r>
               <a:rPr lang="it-IT" sz="3600" dirty="0"/>
-              <a:t>Swap IN 1/2</a:t>
+              <a:t>  Load frame from ELF</a:t>
             </a:r>
             <a:br>
               <a:rPr lang="it-IT" sz="4400" dirty="0"/>
@@ -15286,10 +15262,10 @@
       </p:pic>
       <p:pic>
         <p:nvPicPr>
-          <p:cNvPr id="3" name="Immagine 2" descr="Immagine che contiene diagramma&#10;&#10;Descrizione generata automaticamente">
-            <a:extLst>
-              <a:ext uri="{FF2B5EF4-FFF2-40B4-BE49-F238E27FC236}">
-                <a16:creationId xmlns:a16="http://schemas.microsoft.com/office/drawing/2014/main" id="{7FB349B6-AEB3-82D2-5579-DE9904BBE6D1}"/>
+          <p:cNvPr id="2" name="Immagine 1">
+            <a:extLst>
+              <a:ext uri="{FF2B5EF4-FFF2-40B4-BE49-F238E27FC236}">
+                <a16:creationId xmlns:a16="http://schemas.microsoft.com/office/drawing/2014/main" id="{4504122B-0E78-FF80-8EE5-33A92F01D590}"/>
               </a:ext>
             </a:extLst>
           </p:cNvPr>
@@ -15306,8 +15282,8 @@
         </p:blipFill>
         <p:spPr>
           <a:xfrm>
-            <a:off x="4388572" y="1287039"/>
-            <a:ext cx="4161651" cy="5089939"/>
+            <a:off x="1605041" y="1874384"/>
+            <a:ext cx="8539065" cy="3626080"/>
           </a:xfrm>
           <a:prstGeom prst="rect">
             <a:avLst/>
@@ -15317,7 +15293,7 @@
     </p:spTree>
     <p:extLst>
       <p:ext uri="{BB962C8B-B14F-4D97-AF65-F5344CB8AC3E}">
-        <p14:creationId xmlns:p14="http://schemas.microsoft.com/office/powerpoint/2010/main" val="1283932240"/>
+        <p14:creationId xmlns:p14="http://schemas.microsoft.com/office/powerpoint/2010/main" val="59259469"/>
       </p:ext>
     </p:extLst>
   </p:cSld>
@@ -15362,19 +15338,19 @@
         </p:nvSpPr>
         <p:spPr>
           <a:xfrm>
-            <a:off x="8502555" y="203706"/>
-            <a:ext cx="3277767" cy="1446550"/>
+            <a:off x="7962314" y="203706"/>
+            <a:ext cx="3874258" cy="710694"/>
           </a:xfrm>
         </p:spPr>
         <p:txBody>
           <a:bodyPr>
-            <a:normAutofit/>
+            <a:normAutofit fontScale="90000"/>
           </a:bodyPr>
           <a:lstStyle/>
           <a:p>
             <a:r>
               <a:rPr lang="it-IT" sz="3600" dirty="0"/>
-              <a:t>Swap IN 2/2</a:t>
+              <a:t>  Load frame from ELF</a:t>
             </a:r>
             <a:br>
               <a:rPr lang="it-IT" sz="4400" dirty="0"/>
@@ -15456,430 +15432,12 @@
           </a:prstGeom>
         </p:spPr>
       </p:pic>
-      <p:sp>
-        <p:nvSpPr>
-          <p:cNvPr id="4" name="Segnaposto contenuto 1">
-            <a:extLst>
-              <a:ext uri="{FF2B5EF4-FFF2-40B4-BE49-F238E27FC236}">
-                <a16:creationId xmlns:a16="http://schemas.microsoft.com/office/drawing/2014/main" id="{EE5093D1-1437-8E8E-DEB0-6D7CAA3FB0A9}"/>
-              </a:ext>
-            </a:extLst>
-          </p:cNvPr>
-          <p:cNvSpPr txBox="1">
-            <a:spLocks/>
-          </p:cNvSpPr>
-          <p:nvPr/>
-        </p:nvSpPr>
-        <p:spPr>
-          <a:xfrm>
-            <a:off x="470147" y="1621580"/>
-            <a:ext cx="7653436" cy="4527425"/>
-          </a:xfrm>
-          <a:prstGeom prst="rect">
-            <a:avLst/>
-          </a:prstGeom>
-        </p:spPr>
-        <p:txBody>
-          <a:bodyPr>
-            <a:normAutofit/>
-          </a:bodyPr>
-          <a:lstStyle>
-            <a:lvl1pPr marL="228600" indent="-228600" algn="l" defTabSz="914400" rtl="0" eaLnBrk="1" latinLnBrk="0" hangingPunct="1">
-              <a:lnSpc>
-                <a:spcPct val="100000"/>
-              </a:lnSpc>
-              <a:spcBef>
-                <a:spcPts val="1000"/>
-              </a:spcBef>
-              <a:buFont typeface="System Font Regular"/>
-              <a:buChar char="–"/>
-              <a:defRPr sz="2400" b="0" i="0" kern="1200">
-                <a:solidFill>
-                  <a:schemeClr val="tx1"/>
-                </a:solidFill>
-                <a:latin typeface="+mn-lt"/>
-                <a:ea typeface="+mn-ea"/>
-                <a:cs typeface="+mn-cs"/>
-              </a:defRPr>
-            </a:lvl1pPr>
-            <a:lvl2pPr marL="685800" indent="-228600" algn="l" defTabSz="914400" rtl="0" eaLnBrk="1" latinLnBrk="0" hangingPunct="1">
-              <a:lnSpc>
-                <a:spcPct val="100000"/>
-              </a:lnSpc>
-              <a:spcBef>
-                <a:spcPts val="500"/>
-              </a:spcBef>
-              <a:buFont typeface="System Font Regular"/>
-              <a:buChar char="–"/>
-              <a:defRPr sz="2000" b="0" i="0" kern="1200">
-                <a:solidFill>
-                  <a:schemeClr val="tx1"/>
-                </a:solidFill>
-                <a:latin typeface="+mn-lt"/>
-                <a:ea typeface="+mn-ea"/>
-                <a:cs typeface="+mn-cs"/>
-              </a:defRPr>
-            </a:lvl2pPr>
-            <a:lvl3pPr marL="1143000" indent="-228600" algn="l" defTabSz="914400" rtl="0" eaLnBrk="1" latinLnBrk="0" hangingPunct="1">
-              <a:lnSpc>
-                <a:spcPct val="100000"/>
-              </a:lnSpc>
-              <a:spcBef>
-                <a:spcPts val="500"/>
-              </a:spcBef>
-              <a:buFont typeface="System Font Regular"/>
-              <a:buChar char="–"/>
-              <a:defRPr sz="1800" b="0" i="0" kern="1200">
-                <a:solidFill>
-                  <a:schemeClr val="tx1"/>
-                </a:solidFill>
-                <a:latin typeface="+mn-lt"/>
-                <a:ea typeface="+mn-ea"/>
-                <a:cs typeface="+mn-cs"/>
-              </a:defRPr>
-            </a:lvl3pPr>
-            <a:lvl4pPr marL="1600200" indent="-228600" algn="l" defTabSz="914400" rtl="0" eaLnBrk="1" latinLnBrk="0" hangingPunct="1">
-              <a:lnSpc>
-                <a:spcPct val="100000"/>
-              </a:lnSpc>
-              <a:spcBef>
-                <a:spcPts val="500"/>
-              </a:spcBef>
-              <a:buFont typeface="System Font Regular"/>
-              <a:buChar char="–"/>
-              <a:defRPr sz="1600" b="0" i="0" kern="1200">
-                <a:solidFill>
-                  <a:schemeClr val="tx1"/>
-                </a:solidFill>
-                <a:latin typeface="+mn-lt"/>
-                <a:ea typeface="+mn-ea"/>
-                <a:cs typeface="+mn-cs"/>
-              </a:defRPr>
-            </a:lvl4pPr>
-            <a:lvl5pPr marL="2057400" indent="-228600" algn="l" defTabSz="914400" rtl="0" eaLnBrk="1" latinLnBrk="0" hangingPunct="1">
-              <a:lnSpc>
-                <a:spcPct val="100000"/>
-              </a:lnSpc>
-              <a:spcBef>
-                <a:spcPts val="500"/>
-              </a:spcBef>
-              <a:buFont typeface="System Font Regular"/>
-              <a:buChar char="–"/>
-              <a:defRPr sz="1600" b="0" i="0" kern="1200">
-                <a:solidFill>
-                  <a:schemeClr val="tx1"/>
-                </a:solidFill>
-                <a:latin typeface="+mn-lt"/>
-                <a:ea typeface="+mn-ea"/>
-                <a:cs typeface="+mn-cs"/>
-              </a:defRPr>
-            </a:lvl5pPr>
-            <a:lvl6pPr marL="2514600" indent="-228600" algn="l" defTabSz="914400" rtl="0" eaLnBrk="1" latinLnBrk="0" hangingPunct="1">
-              <a:lnSpc>
-                <a:spcPct val="90000"/>
-              </a:lnSpc>
-              <a:spcBef>
-                <a:spcPts val="500"/>
-              </a:spcBef>
-              <a:buFont typeface="Arial" panose="020B0604020202020204" pitchFamily="34" charset="0"/>
-              <a:buChar char="•"/>
-              <a:defRPr sz="1800" kern="1200">
-                <a:solidFill>
-                  <a:schemeClr val="tx1"/>
-                </a:solidFill>
-                <a:latin typeface="+mn-lt"/>
-                <a:ea typeface="+mn-ea"/>
-                <a:cs typeface="+mn-cs"/>
-              </a:defRPr>
-            </a:lvl6pPr>
-            <a:lvl7pPr marL="2971800" indent="-228600" algn="l" defTabSz="914400" rtl="0" eaLnBrk="1" latinLnBrk="0" hangingPunct="1">
-              <a:lnSpc>
-                <a:spcPct val="90000"/>
-              </a:lnSpc>
-              <a:spcBef>
-                <a:spcPts val="500"/>
-              </a:spcBef>
-              <a:buFont typeface="Arial" panose="020B0604020202020204" pitchFamily="34" charset="0"/>
-              <a:buChar char="•"/>
-              <a:defRPr sz="1800" kern="1200">
-                <a:solidFill>
-                  <a:schemeClr val="tx1"/>
-                </a:solidFill>
-                <a:latin typeface="+mn-lt"/>
-                <a:ea typeface="+mn-ea"/>
-                <a:cs typeface="+mn-cs"/>
-              </a:defRPr>
-            </a:lvl7pPr>
-            <a:lvl8pPr marL="3429000" indent="-228600" algn="l" defTabSz="914400" rtl="0" eaLnBrk="1" latinLnBrk="0" hangingPunct="1">
-              <a:lnSpc>
-                <a:spcPct val="90000"/>
-              </a:lnSpc>
-              <a:spcBef>
-                <a:spcPts val="500"/>
-              </a:spcBef>
-              <a:buFont typeface="Arial" panose="020B0604020202020204" pitchFamily="34" charset="0"/>
-              <a:buChar char="•"/>
-              <a:defRPr sz="1800" kern="1200">
-                <a:solidFill>
-                  <a:schemeClr val="tx1"/>
-                </a:solidFill>
-                <a:latin typeface="+mn-lt"/>
-                <a:ea typeface="+mn-ea"/>
-                <a:cs typeface="+mn-cs"/>
-              </a:defRPr>
-            </a:lvl8pPr>
-            <a:lvl9pPr marL="3886200" indent="-228600" algn="l" defTabSz="914400" rtl="0" eaLnBrk="1" latinLnBrk="0" hangingPunct="1">
-              <a:lnSpc>
-                <a:spcPct val="90000"/>
-              </a:lnSpc>
-              <a:spcBef>
-                <a:spcPts val="500"/>
-              </a:spcBef>
-              <a:buFont typeface="Arial" panose="020B0604020202020204" pitchFamily="34" charset="0"/>
-              <a:buChar char="•"/>
-              <a:defRPr sz="1800" kern="1200">
-                <a:solidFill>
-                  <a:schemeClr val="tx1"/>
-                </a:solidFill>
-                <a:latin typeface="+mn-lt"/>
-                <a:ea typeface="+mn-ea"/>
-                <a:cs typeface="+mn-cs"/>
-              </a:defRPr>
-            </a:lvl9pPr>
-          </a:lstStyle>
-          <a:p>
-            <a:pPr>
-              <a:buFont typeface="Arial" panose="020B0604020202020204" pitchFamily="34" charset="0"/>
-              <a:buChar char="•"/>
-            </a:pPr>
-            <a:r>
-              <a:rPr lang="it-IT" dirty="0" err="1">
-                <a:solidFill>
-                  <a:schemeClr val="tx2"/>
-                </a:solidFill>
-              </a:rPr>
-              <a:t>Search_swapped_frame</a:t>
-            </a:r>
-            <a:r>
-              <a:rPr lang="it-IT" dirty="0">
-                <a:solidFill>
-                  <a:schemeClr val="tx2"/>
-                </a:solidFill>
-              </a:rPr>
-              <a:t>(</a:t>
-            </a:r>
-            <a:r>
-              <a:rPr lang="it-IT" dirty="0" err="1">
-                <a:solidFill>
-                  <a:schemeClr val="accent1">
-                    <a:lumMod val="20000"/>
-                    <a:lumOff val="80000"/>
-                  </a:schemeClr>
-                </a:solidFill>
-              </a:rPr>
-              <a:t>vaddr_t</a:t>
-            </a:r>
-            <a:r>
-              <a:rPr lang="it-IT" dirty="0">
-                <a:solidFill>
-                  <a:schemeClr val="accent1">
-                    <a:lumMod val="20000"/>
-                    <a:lumOff val="80000"/>
-                  </a:schemeClr>
-                </a:solidFill>
-              </a:rPr>
-              <a:t> </a:t>
-            </a:r>
-            <a:r>
-              <a:rPr lang="it-IT" dirty="0" err="1"/>
-              <a:t>vaddr</a:t>
-            </a:r>
-            <a:r>
-              <a:rPr lang="it-IT" dirty="0">
-                <a:solidFill>
-                  <a:schemeClr val="tx2"/>
-                </a:solidFill>
-              </a:rPr>
-              <a:t>)</a:t>
-            </a:r>
-          </a:p>
-          <a:p>
-            <a:pPr marL="0" indent="0">
-              <a:buNone/>
-            </a:pPr>
-            <a:endParaRPr lang="it-IT" dirty="0">
-              <a:solidFill>
-                <a:schemeClr val="tx2"/>
-              </a:solidFill>
-            </a:endParaRPr>
-          </a:p>
-          <a:p>
-            <a:pPr>
-              <a:buFont typeface="Arial" panose="020B0604020202020204" pitchFamily="34" charset="0"/>
-              <a:buChar char="•"/>
-            </a:pPr>
-            <a:endParaRPr lang="it-IT" dirty="0">
-              <a:solidFill>
-                <a:schemeClr val="tx2"/>
-              </a:solidFill>
-            </a:endParaRPr>
-          </a:p>
-          <a:p>
-            <a:pPr>
-              <a:buFont typeface="Arial" panose="020B0604020202020204" pitchFamily="34" charset="0"/>
-              <a:buChar char="•"/>
-            </a:pPr>
-            <a:endParaRPr lang="it-IT" dirty="0">
-              <a:solidFill>
-                <a:schemeClr val="tx2"/>
-              </a:solidFill>
-            </a:endParaRPr>
-          </a:p>
-          <a:p>
-            <a:pPr>
-              <a:buFont typeface="Arial" panose="020B0604020202020204" pitchFamily="34" charset="0"/>
-              <a:buChar char="•"/>
-            </a:pPr>
-            <a:endParaRPr lang="it-IT" dirty="0">
-              <a:solidFill>
-                <a:schemeClr val="tx2"/>
-              </a:solidFill>
-            </a:endParaRPr>
-          </a:p>
-          <a:p>
-            <a:pPr>
-              <a:buFont typeface="Arial" panose="020B0604020202020204" pitchFamily="34" charset="0"/>
-              <a:buChar char="•"/>
-            </a:pPr>
-            <a:endParaRPr lang="it-IT" dirty="0">
-              <a:solidFill>
-                <a:schemeClr val="tx2"/>
-              </a:solidFill>
-            </a:endParaRPr>
-          </a:p>
-          <a:p>
-            <a:pPr>
-              <a:buFont typeface="Arial" panose="020B0604020202020204" pitchFamily="34" charset="0"/>
-              <a:buChar char="•"/>
-            </a:pPr>
-            <a:r>
-              <a:rPr lang="it-IT" dirty="0" err="1">
-                <a:solidFill>
-                  <a:schemeClr val="tx2"/>
-                </a:solidFill>
-              </a:rPr>
-              <a:t>Swappage_IN</a:t>
-            </a:r>
-            <a:r>
-              <a:rPr lang="it-IT" dirty="0">
-                <a:solidFill>
-                  <a:schemeClr val="tx2"/>
-                </a:solidFill>
-              </a:rPr>
-              <a:t>(</a:t>
-            </a:r>
-            <a:r>
-              <a:rPr lang="it-IT" dirty="0" err="1">
-                <a:solidFill>
-                  <a:schemeClr val="accent1">
-                    <a:lumMod val="20000"/>
-                    <a:lumOff val="80000"/>
-                  </a:schemeClr>
-                </a:solidFill>
-              </a:rPr>
-              <a:t>vaddr_t</a:t>
-            </a:r>
-            <a:r>
-              <a:rPr lang="it-IT" dirty="0">
-                <a:solidFill>
-                  <a:schemeClr val="accent1">
-                    <a:lumMod val="20000"/>
-                    <a:lumOff val="80000"/>
-                  </a:schemeClr>
-                </a:solidFill>
-              </a:rPr>
-              <a:t> </a:t>
-            </a:r>
-            <a:r>
-              <a:rPr lang="it-IT" dirty="0" err="1"/>
-              <a:t>vaddr</a:t>
-            </a:r>
-            <a:r>
-              <a:rPr lang="it-IT" dirty="0"/>
-              <a:t>, </a:t>
-            </a:r>
-            <a:r>
-              <a:rPr lang="it-IT" dirty="0" err="1">
-                <a:solidFill>
-                  <a:schemeClr val="accent1">
-                    <a:lumMod val="20000"/>
-                    <a:lumOff val="80000"/>
-                  </a:schemeClr>
-                </a:solidFill>
-              </a:rPr>
-              <a:t>off_t</a:t>
-            </a:r>
-            <a:r>
-              <a:rPr lang="it-IT" dirty="0">
-                <a:solidFill>
-                  <a:schemeClr val="accent1">
-                    <a:lumMod val="20000"/>
-                    <a:lumOff val="80000"/>
-                  </a:schemeClr>
-                </a:solidFill>
-              </a:rPr>
-              <a:t> </a:t>
-            </a:r>
-            <a:r>
-              <a:rPr lang="it-IT" dirty="0" err="1"/>
-              <a:t>swapaddr</a:t>
-            </a:r>
-            <a:r>
-              <a:rPr lang="it-IT" dirty="0">
-                <a:solidFill>
-                  <a:schemeClr val="tx2"/>
-                </a:solidFill>
-              </a:rPr>
-              <a:t>)</a:t>
-            </a:r>
-            <a:endParaRPr lang="it-IT" dirty="0"/>
-          </a:p>
-          <a:p>
-            <a:pPr marL="0" indent="0">
-              <a:buFont typeface="System Font Regular"/>
-              <a:buNone/>
-            </a:pPr>
-            <a:endParaRPr lang="it-IT" dirty="0"/>
-          </a:p>
-          <a:p>
-            <a:pPr marL="0" indent="0">
-              <a:buFont typeface="System Font Regular"/>
-              <a:buNone/>
-            </a:pPr>
-            <a:endParaRPr lang="it-IT" dirty="0"/>
-          </a:p>
-          <a:p>
-            <a:pPr marL="0" indent="0">
-              <a:buFont typeface="System Font Regular"/>
-              <a:buNone/>
-            </a:pPr>
-            <a:endParaRPr lang="it-IT" dirty="0"/>
-          </a:p>
-          <a:p>
-            <a:pPr marL="0" indent="0">
-              <a:buFont typeface="System Font Regular"/>
-              <a:buNone/>
-            </a:pPr>
-            <a:endParaRPr lang="it-IT" dirty="0"/>
-          </a:p>
-        </p:txBody>
-      </p:sp>
       <p:pic>
         <p:nvPicPr>
-          <p:cNvPr id="6" name="Immagine 5">
-            <a:extLst>
-              <a:ext uri="{FF2B5EF4-FFF2-40B4-BE49-F238E27FC236}">
-                <a16:creationId xmlns:a16="http://schemas.microsoft.com/office/drawing/2014/main" id="{86DBC7D7-B0E0-AEC9-A93E-B31BFE13B779}"/>
+          <p:cNvPr id="3" name="Immagine 2" descr="Immagine che contiene testo&#10;&#10;Descrizione generata automaticamente">
+            <a:extLst>
+              <a:ext uri="{FF2B5EF4-FFF2-40B4-BE49-F238E27FC236}">
+                <a16:creationId xmlns:a16="http://schemas.microsoft.com/office/drawing/2014/main" id="{DBBA7199-C60C-BE5D-08C5-895371160B2A}"/>
               </a:ext>
             </a:extLst>
           </p:cNvPr>
@@ -15896,62 +15454,377 @@
         </p:blipFill>
         <p:spPr>
           <a:xfrm>
-            <a:off x="1993900" y="5206494"/>
-            <a:ext cx="4102100" cy="1447800"/>
+            <a:off x="791529" y="1389185"/>
+            <a:ext cx="9491956" cy="1872117"/>
           </a:xfrm>
           <a:prstGeom prst="rect">
             <a:avLst/>
           </a:prstGeom>
-          <a:ln>
-            <a:solidFill>
-              <a:schemeClr val="bg1">
-                <a:lumMod val="75000"/>
-              </a:schemeClr>
-            </a:solidFill>
-          </a:ln>
         </p:spPr>
       </p:pic>
-      <p:pic>
-        <p:nvPicPr>
-          <p:cNvPr id="8" name="Immagine 7" descr="Immagine che contiene testo&#10;&#10;Descrizione generata automaticamente">
-            <a:extLst>
-              <a:ext uri="{FF2B5EF4-FFF2-40B4-BE49-F238E27FC236}">
-                <a16:creationId xmlns:a16="http://schemas.microsoft.com/office/drawing/2014/main" id="{3C0DFADA-6DBF-1E09-5C4D-930515C6A7B7}"/>
-              </a:ext>
-            </a:extLst>
-          </p:cNvPr>
-          <p:cNvPicPr>
-            <a:picLocks noChangeAspect="1"/>
-          </p:cNvPicPr>
+      <p:sp>
+        <p:nvSpPr>
+          <p:cNvPr id="4" name="CasellaDiTesto 3">
+            <a:extLst>
+              <a:ext uri="{FF2B5EF4-FFF2-40B4-BE49-F238E27FC236}">
+                <a16:creationId xmlns:a16="http://schemas.microsoft.com/office/drawing/2014/main" id="{D96613ED-0EF6-435E-4DBA-E73CA4466CA8}"/>
+              </a:ext>
+            </a:extLst>
+          </p:cNvPr>
+          <p:cNvSpPr txBox="1"/>
           <p:nvPr/>
-        </p:nvPicPr>
-        <p:blipFill>
-          <a:blip r:embed="rId4"/>
-          <a:stretch>
-            <a:fillRect/>
-          </a:stretch>
-        </p:blipFill>
-        <p:spPr>
-          <a:xfrm>
-            <a:off x="1993900" y="2274110"/>
-            <a:ext cx="7772400" cy="2225205"/>
+        </p:nvSpPr>
+        <p:spPr>
+          <a:xfrm>
+            <a:off x="1055077" y="3629465"/>
+            <a:ext cx="10480431" cy="1554272"/>
           </a:xfrm>
           <a:prstGeom prst="rect">
             <a:avLst/>
           </a:prstGeom>
-          <a:ln>
-            <a:solidFill>
-              <a:schemeClr val="bg1">
-                <a:lumMod val="75000"/>
-              </a:schemeClr>
-            </a:solidFill>
-          </a:ln>
-        </p:spPr>
-      </p:pic>
+          <a:noFill/>
+        </p:spPr>
+        <p:txBody>
+          <a:bodyPr wrap="square" rtlCol="0">
+            <a:spAutoFit/>
+          </a:bodyPr>
+          <a:lstStyle/>
+          <a:p>
+            <a:r>
+              <a:rPr lang="it-IT" sz="1900" dirty="0"/>
+              <a:t>-</a:t>
+            </a:r>
+            <a:r>
+              <a:rPr lang="it-IT" sz="1900" dirty="0" err="1"/>
+              <a:t>It</a:t>
+            </a:r>
+            <a:r>
+              <a:rPr lang="it-IT" sz="1900" dirty="0"/>
+              <a:t> </a:t>
+            </a:r>
+            <a:r>
+              <a:rPr lang="it-IT" sz="1900" dirty="0" err="1"/>
+              <a:t>is</a:t>
+            </a:r>
+            <a:r>
+              <a:rPr lang="it-IT" sz="1900" dirty="0"/>
+              <a:t> </a:t>
+            </a:r>
+            <a:r>
+              <a:rPr lang="it-IT" sz="1900" dirty="0" err="1"/>
+              <a:t>important</a:t>
+            </a:r>
+            <a:r>
+              <a:rPr lang="it-IT" sz="1900" dirty="0"/>
+              <a:t> to check </a:t>
+            </a:r>
+            <a:r>
+              <a:rPr lang="it-IT" sz="1900" dirty="0" err="1"/>
+              <a:t>whether</a:t>
+            </a:r>
+            <a:r>
+              <a:rPr lang="it-IT" sz="1900" dirty="0"/>
+              <a:t> </a:t>
+            </a:r>
+            <a:r>
+              <a:rPr lang="it-IT" sz="1900" dirty="0" err="1"/>
+              <a:t>considering</a:t>
+            </a:r>
+            <a:r>
+              <a:rPr lang="it-IT" sz="1900" dirty="0"/>
+              <a:t> the last frame of the </a:t>
+            </a:r>
+            <a:r>
+              <a:rPr lang="it-IT" sz="1900" dirty="0" err="1"/>
+              <a:t>segment</a:t>
+            </a:r>
+            <a:r>
+              <a:rPr lang="it-IT" sz="1900" dirty="0"/>
+              <a:t> or </a:t>
+            </a:r>
+            <a:r>
+              <a:rPr lang="it-IT" sz="1900" dirty="0" err="1"/>
+              <a:t>not</a:t>
+            </a:r>
+            <a:r>
+              <a:rPr lang="it-IT" sz="1900" dirty="0"/>
+              <a:t>:</a:t>
+            </a:r>
+          </a:p>
+          <a:p>
+            <a:r>
+              <a:rPr lang="it-IT" sz="1900" dirty="0" err="1"/>
+              <a:t>Usually</a:t>
+            </a:r>
+            <a:r>
+              <a:rPr lang="it-IT" sz="1900" dirty="0"/>
+              <a:t> </a:t>
+            </a:r>
+            <a:r>
+              <a:rPr lang="it-IT" sz="1900" dirty="0" err="1"/>
+              <a:t>what</a:t>
+            </a:r>
+            <a:r>
+              <a:rPr lang="it-IT" sz="1900" dirty="0"/>
+              <a:t> </a:t>
+            </a:r>
+            <a:r>
+              <a:rPr lang="it-IT" sz="1900" dirty="0" err="1"/>
+              <a:t>happens</a:t>
+            </a:r>
+            <a:r>
+              <a:rPr lang="it-IT" sz="1900" dirty="0"/>
+              <a:t> </a:t>
+            </a:r>
+            <a:r>
+              <a:rPr lang="it-IT" sz="1900" dirty="0" err="1"/>
+              <a:t>is</a:t>
+            </a:r>
+            <a:r>
+              <a:rPr lang="it-IT" sz="1900" dirty="0"/>
+              <a:t> </a:t>
+            </a:r>
+            <a:r>
+              <a:rPr lang="it-IT" sz="1900" dirty="0" err="1"/>
+              <a:t>that</a:t>
+            </a:r>
+            <a:r>
+              <a:rPr lang="it-IT" sz="1900" dirty="0"/>
+              <a:t> the </a:t>
+            </a:r>
+            <a:r>
+              <a:rPr lang="it-IT" sz="1900" dirty="0" err="1"/>
+              <a:t>segmnet</a:t>
+            </a:r>
+            <a:r>
+              <a:rPr lang="it-IT" sz="1900" dirty="0"/>
+              <a:t> </a:t>
+            </a:r>
+            <a:r>
+              <a:rPr lang="it-IT" sz="1900" dirty="0" err="1"/>
+              <a:t>is</a:t>
+            </a:r>
+            <a:r>
+              <a:rPr lang="it-IT" sz="1900" dirty="0"/>
+              <a:t> </a:t>
+            </a:r>
+            <a:r>
+              <a:rPr lang="it-IT" sz="1900" dirty="0" err="1"/>
+              <a:t>not</a:t>
+            </a:r>
+            <a:r>
+              <a:rPr lang="it-IT" sz="1900" dirty="0"/>
+              <a:t> an </a:t>
+            </a:r>
+            <a:r>
+              <a:rPr lang="it-IT" sz="1900" dirty="0" err="1"/>
+              <a:t>exact</a:t>
+            </a:r>
+            <a:r>
+              <a:rPr lang="it-IT" sz="1900" dirty="0"/>
+              <a:t> multiple of a frame size(4096 BYTES). </a:t>
+            </a:r>
+          </a:p>
+          <a:p>
+            <a:r>
+              <a:rPr lang="it-IT" sz="1900" dirty="0" err="1"/>
+              <a:t>It</a:t>
+            </a:r>
+            <a:r>
+              <a:rPr lang="it-IT" sz="1900" dirty="0"/>
+              <a:t> </a:t>
+            </a:r>
+            <a:r>
+              <a:rPr lang="it-IT" sz="1900" dirty="0" err="1"/>
+              <a:t>means</a:t>
+            </a:r>
+            <a:r>
+              <a:rPr lang="it-IT" sz="1900" dirty="0"/>
+              <a:t> </a:t>
+            </a:r>
+            <a:r>
+              <a:rPr lang="it-IT" sz="1900" dirty="0" err="1"/>
+              <a:t>that</a:t>
+            </a:r>
+            <a:r>
+              <a:rPr lang="it-IT" sz="1900" dirty="0"/>
+              <a:t> </a:t>
+            </a:r>
+            <a:r>
+              <a:rPr lang="it-IT" sz="1900" dirty="0" err="1"/>
+              <a:t>implementing</a:t>
+            </a:r>
+            <a:r>
+              <a:rPr lang="it-IT" sz="1900" dirty="0"/>
+              <a:t> DEMAND </a:t>
+            </a:r>
+            <a:r>
+              <a:rPr lang="it-IT" sz="1900" dirty="0" err="1"/>
+              <a:t>PAGING,so</a:t>
+            </a:r>
+            <a:r>
+              <a:rPr lang="it-IT" sz="1900" dirty="0"/>
+              <a:t> </a:t>
+            </a:r>
+            <a:r>
+              <a:rPr lang="it-IT" sz="1900" dirty="0" err="1"/>
+              <a:t>selecting</a:t>
+            </a:r>
+            <a:r>
+              <a:rPr lang="it-IT" sz="1900" dirty="0"/>
+              <a:t> </a:t>
+            </a:r>
+            <a:r>
+              <a:rPr lang="it-IT" sz="1900" dirty="0" err="1"/>
+              <a:t>only</a:t>
+            </a:r>
+            <a:r>
+              <a:rPr lang="it-IT" sz="1900" dirty="0"/>
+              <a:t> a page </a:t>
+            </a:r>
+            <a:r>
+              <a:rPr lang="it-IT" sz="1900" dirty="0" err="1"/>
+              <a:t>each</a:t>
+            </a:r>
+            <a:r>
+              <a:rPr lang="it-IT" sz="1900" dirty="0"/>
+              <a:t> </a:t>
+            </a:r>
+            <a:r>
+              <a:rPr lang="it-IT" sz="1900" dirty="0" err="1"/>
+              <a:t>time,the</a:t>
+            </a:r>
+            <a:r>
+              <a:rPr lang="it-IT" sz="1900" dirty="0"/>
+              <a:t> last page of a </a:t>
+            </a:r>
+            <a:r>
+              <a:rPr lang="it-IT" sz="1900" dirty="0" err="1"/>
+              <a:t>segment</a:t>
+            </a:r>
+            <a:r>
+              <a:rPr lang="it-IT" sz="1900" dirty="0"/>
+              <a:t> </a:t>
+            </a:r>
+            <a:r>
+              <a:rPr lang="it-IT" sz="1900" dirty="0" err="1"/>
+              <a:t>will</a:t>
+            </a:r>
+            <a:r>
+              <a:rPr lang="it-IT" sz="1900" dirty="0"/>
+              <a:t> </a:t>
+            </a:r>
+            <a:r>
+              <a:rPr lang="it-IT" sz="1900" dirty="0" err="1"/>
+              <a:t>have</a:t>
+            </a:r>
+            <a:r>
+              <a:rPr lang="it-IT" sz="1900" dirty="0"/>
+              <a:t> </a:t>
+            </a:r>
+            <a:r>
+              <a:rPr lang="it-IT" sz="1900" dirty="0" err="1"/>
+              <a:t>surely</a:t>
+            </a:r>
+            <a:r>
+              <a:rPr lang="it-IT" sz="1900" dirty="0"/>
+              <a:t> a </a:t>
+            </a:r>
+            <a:r>
+              <a:rPr lang="it-IT" sz="1900" dirty="0" err="1"/>
+              <a:t>dimension</a:t>
+            </a:r>
+            <a:r>
+              <a:rPr lang="it-IT" sz="1900" dirty="0"/>
+              <a:t> </a:t>
+            </a:r>
+            <a:r>
+              <a:rPr lang="it-IT" sz="1900" dirty="0" err="1"/>
+              <a:t>lower</a:t>
+            </a:r>
+            <a:r>
+              <a:rPr lang="it-IT" sz="1900" dirty="0"/>
+              <a:t> </a:t>
+            </a:r>
+            <a:r>
+              <a:rPr lang="it-IT" sz="1900" dirty="0" err="1"/>
+              <a:t>than</a:t>
+            </a:r>
+            <a:r>
+              <a:rPr lang="it-IT" sz="1900" dirty="0"/>
+              <a:t> 4096 BYTES and </a:t>
+            </a:r>
+            <a:r>
+              <a:rPr lang="it-IT" sz="1900" dirty="0" err="1"/>
+              <a:t>it</a:t>
+            </a:r>
+            <a:r>
+              <a:rPr lang="it-IT" sz="1900" dirty="0"/>
+              <a:t> must be </a:t>
+            </a:r>
+            <a:r>
+              <a:rPr lang="it-IT" sz="1900" dirty="0" err="1"/>
+              <a:t>guaranteed</a:t>
+            </a:r>
+            <a:r>
+              <a:rPr lang="it-IT" sz="1900" dirty="0"/>
+              <a:t> to upload </a:t>
+            </a:r>
+            <a:r>
+              <a:rPr lang="it-IT" sz="1900" dirty="0" err="1"/>
+              <a:t>exactly</a:t>
+            </a:r>
+            <a:r>
+              <a:rPr lang="it-IT" sz="1900" dirty="0"/>
+              <a:t> </a:t>
+            </a:r>
+            <a:r>
+              <a:rPr lang="it-IT" sz="1900" dirty="0" err="1"/>
+              <a:t>that</a:t>
+            </a:r>
+            <a:r>
+              <a:rPr lang="it-IT" sz="1900" dirty="0"/>
+              <a:t> </a:t>
+            </a:r>
+            <a:r>
+              <a:rPr lang="it-IT" sz="1900" dirty="0" err="1"/>
+              <a:t>dimension</a:t>
+            </a:r>
+            <a:r>
+              <a:rPr lang="it-IT" sz="1900" dirty="0"/>
+              <a:t> in </a:t>
+            </a:r>
+            <a:r>
+              <a:rPr lang="it-IT" sz="1900" dirty="0" err="1"/>
+              <a:t>order</a:t>
+            </a:r>
+            <a:r>
+              <a:rPr lang="it-IT" sz="1900" dirty="0"/>
+              <a:t> to </a:t>
+            </a:r>
+            <a:r>
+              <a:rPr lang="it-IT" sz="1900" dirty="0" err="1"/>
+              <a:t>not</a:t>
+            </a:r>
+            <a:r>
+              <a:rPr lang="it-IT" sz="1900" dirty="0"/>
+              <a:t> </a:t>
+            </a:r>
+            <a:r>
+              <a:rPr lang="it-IT" sz="1900" dirty="0" err="1"/>
+              <a:t>let</a:t>
+            </a:r>
+            <a:r>
+              <a:rPr lang="it-IT" sz="1900" dirty="0"/>
+              <a:t> the system crash.</a:t>
+            </a:r>
+          </a:p>
+        </p:txBody>
+      </p:sp>
     </p:spTree>
     <p:extLst>
       <p:ext uri="{BB962C8B-B14F-4D97-AF65-F5344CB8AC3E}">
-        <p14:creationId xmlns:p14="http://schemas.microsoft.com/office/powerpoint/2010/main" val="4037566204"/>
+        <p14:creationId xmlns:p14="http://schemas.microsoft.com/office/powerpoint/2010/main" val="3224111216"/>
       </p:ext>
     </p:extLst>
   </p:cSld>
@@ -15996,19 +15869,19 @@
         </p:nvSpPr>
         <p:spPr>
           <a:xfrm>
-            <a:off x="9007686" y="203706"/>
-            <a:ext cx="2772636" cy="1446550"/>
+            <a:off x="7962314" y="203706"/>
+            <a:ext cx="3874258" cy="710694"/>
           </a:xfrm>
         </p:spPr>
         <p:txBody>
           <a:bodyPr>
-            <a:normAutofit/>
+            <a:normAutofit fontScale="90000"/>
           </a:bodyPr>
           <a:lstStyle/>
           <a:p>
             <a:r>
               <a:rPr lang="it-IT" sz="3600" dirty="0"/>
-              <a:t>VM Fault 3/4</a:t>
+              <a:t>  Load frame from ELF</a:t>
             </a:r>
             <a:br>
               <a:rPr lang="it-IT" sz="4400" dirty="0"/>
@@ -16092,10 +15965,10 @@
       </p:pic>
       <p:pic>
         <p:nvPicPr>
-          <p:cNvPr id="4" name="Immagine 3">
-            <a:extLst>
-              <a:ext uri="{FF2B5EF4-FFF2-40B4-BE49-F238E27FC236}">
-                <a16:creationId xmlns:a16="http://schemas.microsoft.com/office/drawing/2014/main" id="{E73C62F4-9A61-E1AA-B7CD-F71B3DAE018C}"/>
+          <p:cNvPr id="12" name="Immagine 11" descr="Immagine che contiene diagramma&#10;&#10;Descrizione generata automaticamente">
+            <a:extLst>
+              <a:ext uri="{FF2B5EF4-FFF2-40B4-BE49-F238E27FC236}">
+                <a16:creationId xmlns:a16="http://schemas.microsoft.com/office/drawing/2014/main" id="{C36444AB-728C-4FD5-6DE4-1A6D8025D7C0}"/>
               </a:ext>
             </a:extLst>
           </p:cNvPr>
@@ -16112,38 +15985,8 @@
         </p:blipFill>
         <p:spPr>
           <a:xfrm>
-            <a:off x="1595251" y="1625095"/>
-            <a:ext cx="9413175" cy="4881491"/>
-          </a:xfrm>
-          <a:prstGeom prst="rect">
-            <a:avLst/>
-          </a:prstGeom>
-        </p:spPr>
-      </p:pic>
-      <p:pic>
-        <p:nvPicPr>
-          <p:cNvPr id="5" name="Immagine 4">
-            <a:extLst>
-              <a:ext uri="{FF2B5EF4-FFF2-40B4-BE49-F238E27FC236}">
-                <a16:creationId xmlns:a16="http://schemas.microsoft.com/office/drawing/2014/main" id="{55AE0250-58A9-67F7-4E02-377FFF686368}"/>
-              </a:ext>
-            </a:extLst>
-          </p:cNvPr>
-          <p:cNvPicPr>
-            <a:picLocks noChangeAspect="1"/>
-          </p:cNvPicPr>
-          <p:nvPr/>
-        </p:nvPicPr>
-        <p:blipFill>
-          <a:blip r:embed="rId4"/>
-          <a:stretch>
-            <a:fillRect/>
-          </a:stretch>
-        </p:blipFill>
-        <p:spPr>
-          <a:xfrm>
-            <a:off x="1894006" y="5549023"/>
-            <a:ext cx="1845481" cy="789153"/>
+            <a:off x="1799860" y="1287039"/>
+            <a:ext cx="8099583" cy="5063655"/>
           </a:xfrm>
           <a:prstGeom prst="rect">
             <a:avLst/>
@@ -16153,7 +15996,7 @@
     </p:spTree>
     <p:extLst>
       <p:ext uri="{BB962C8B-B14F-4D97-AF65-F5344CB8AC3E}">
-        <p14:creationId xmlns:p14="http://schemas.microsoft.com/office/powerpoint/2010/main" val="189418669"/>
+        <p14:creationId xmlns:p14="http://schemas.microsoft.com/office/powerpoint/2010/main" val="4282061153"/>
       </p:ext>
     </p:extLst>
   </p:cSld>
@@ -16374,8 +16217,8 @@
         </p:nvSpPr>
         <p:spPr>
           <a:xfrm>
-            <a:off x="8120418" y="203706"/>
-            <a:ext cx="3659904" cy="1446550"/>
+            <a:off x="7962314" y="203706"/>
+            <a:ext cx="3874258" cy="710694"/>
           </a:xfrm>
         </p:spPr>
         <p:txBody>
@@ -16385,12 +16228,8 @@
           <a:lstStyle/>
           <a:p>
             <a:r>
-              <a:rPr lang="it-IT" sz="3600" dirty="0" err="1"/>
-              <a:t>Clean</a:t>
-            </a:r>
-            <a:r>
               <a:rPr lang="it-IT" sz="3600" dirty="0"/>
-              <a:t> Memory frame</a:t>
+              <a:t>  Load frame from ELF</a:t>
             </a:r>
             <a:br>
               <a:rPr lang="it-IT" sz="4400" dirty="0"/>
@@ -16472,10 +16311,40 @@
           </a:prstGeom>
         </p:spPr>
       </p:pic>
+      <p:pic>
+        <p:nvPicPr>
+          <p:cNvPr id="7" name="Immagine 6" descr="Immagine che contiene testo&#10;&#10;Descrizione generata automaticamente">
+            <a:extLst>
+              <a:ext uri="{FF2B5EF4-FFF2-40B4-BE49-F238E27FC236}">
+                <a16:creationId xmlns:a16="http://schemas.microsoft.com/office/drawing/2014/main" id="{541B0D26-EFD9-74ED-A6AF-9DFCBA07E7C8}"/>
+              </a:ext>
+            </a:extLst>
+          </p:cNvPr>
+          <p:cNvPicPr>
+            <a:picLocks noChangeAspect="1"/>
+          </p:cNvPicPr>
+          <p:nvPr/>
+        </p:nvPicPr>
+        <p:blipFill>
+          <a:blip r:embed="rId3"/>
+          <a:stretch>
+            <a:fillRect/>
+          </a:stretch>
+        </p:blipFill>
+        <p:spPr>
+          <a:xfrm>
+            <a:off x="1240825" y="1507797"/>
+            <a:ext cx="8845709" cy="3907408"/>
+          </a:xfrm>
+          <a:prstGeom prst="rect">
+            <a:avLst/>
+          </a:prstGeom>
+        </p:spPr>
+      </p:pic>
     </p:spTree>
     <p:extLst>
       <p:ext uri="{BB962C8B-B14F-4D97-AF65-F5344CB8AC3E}">
-        <p14:creationId xmlns:p14="http://schemas.microsoft.com/office/powerpoint/2010/main" val="3163142864"/>
+        <p14:creationId xmlns:p14="http://schemas.microsoft.com/office/powerpoint/2010/main" val="1956058311"/>
       </p:ext>
     </p:extLst>
   </p:cSld>
@@ -16520,19 +16389,19 @@
         </p:nvSpPr>
         <p:spPr>
           <a:xfrm>
-            <a:off x="9007686" y="203706"/>
-            <a:ext cx="2772636" cy="1446550"/>
+            <a:off x="7962314" y="203706"/>
+            <a:ext cx="3874258" cy="710694"/>
           </a:xfrm>
         </p:spPr>
         <p:txBody>
           <a:bodyPr>
-            <a:normAutofit/>
+            <a:normAutofit fontScale="90000"/>
           </a:bodyPr>
           <a:lstStyle/>
           <a:p>
             <a:r>
               <a:rPr lang="it-IT" sz="3600" dirty="0"/>
-              <a:t>VM Fault 4/4</a:t>
+              <a:t>  Load frame from ELF</a:t>
             </a:r>
             <a:br>
               <a:rPr lang="it-IT" sz="4400" dirty="0"/>
@@ -16616,10 +16485,10 @@
       </p:pic>
       <p:pic>
         <p:nvPicPr>
-          <p:cNvPr id="3" name="Immagine 2">
-            <a:extLst>
-              <a:ext uri="{FF2B5EF4-FFF2-40B4-BE49-F238E27FC236}">
-                <a16:creationId xmlns:a16="http://schemas.microsoft.com/office/drawing/2014/main" id="{059075DD-F2AB-26EA-5048-B1F195E2AD68}"/>
+          <p:cNvPr id="5" name="Immagine 4" descr="Immagine che contiene diagramma&#10;&#10;Descrizione generata automaticamente">
+            <a:extLst>
+              <a:ext uri="{FF2B5EF4-FFF2-40B4-BE49-F238E27FC236}">
+                <a16:creationId xmlns:a16="http://schemas.microsoft.com/office/drawing/2014/main" id="{B2CAE927-1F8A-EC82-6923-96E0491DE5F6}"/>
               </a:ext>
             </a:extLst>
           </p:cNvPr>
@@ -16636,38 +16505,8 @@
         </p:blipFill>
         <p:spPr>
           <a:xfrm>
-            <a:off x="1584941" y="2028733"/>
-            <a:ext cx="9800218" cy="4170184"/>
-          </a:xfrm>
-          <a:prstGeom prst="rect">
-            <a:avLst/>
-          </a:prstGeom>
-        </p:spPr>
-      </p:pic>
-      <p:pic>
-        <p:nvPicPr>
-          <p:cNvPr id="4" name="Immagine 3">
-            <a:extLst>
-              <a:ext uri="{FF2B5EF4-FFF2-40B4-BE49-F238E27FC236}">
-                <a16:creationId xmlns:a16="http://schemas.microsoft.com/office/drawing/2014/main" id="{10C679AB-32F7-479A-9391-B4CA94B85483}"/>
-              </a:ext>
-            </a:extLst>
-          </p:cNvPr>
-          <p:cNvPicPr>
-            <a:picLocks noChangeAspect="1"/>
-          </p:cNvPicPr>
-          <p:nvPr/>
-        </p:nvPicPr>
-        <p:blipFill>
-          <a:blip r:embed="rId4"/>
-          <a:stretch>
-            <a:fillRect/>
-          </a:stretch>
-        </p:blipFill>
-        <p:spPr>
-          <a:xfrm>
-            <a:off x="2472709" y="3713775"/>
-            <a:ext cx="1651000" cy="800100"/>
+            <a:off x="1265402" y="1318918"/>
+            <a:ext cx="9001497" cy="5640259"/>
           </a:xfrm>
           <a:prstGeom prst="rect">
             <a:avLst/>
@@ -16677,7 +16516,7 @@
     </p:spTree>
     <p:extLst>
       <p:ext uri="{BB962C8B-B14F-4D97-AF65-F5344CB8AC3E}">
-        <p14:creationId xmlns:p14="http://schemas.microsoft.com/office/powerpoint/2010/main" val="4185866789"/>
+        <p14:creationId xmlns:p14="http://schemas.microsoft.com/office/powerpoint/2010/main" val="3059383570"/>
       </p:ext>
     </p:extLst>
   </p:cSld>
@@ -16722,19 +16561,19 @@
         </p:nvSpPr>
         <p:spPr>
           <a:xfrm>
-            <a:off x="9007686" y="203706"/>
-            <a:ext cx="2772636" cy="1446550"/>
+            <a:off x="7962314" y="203706"/>
+            <a:ext cx="3874258" cy="710694"/>
           </a:xfrm>
         </p:spPr>
         <p:txBody>
           <a:bodyPr>
-            <a:normAutofit/>
+            <a:normAutofit fontScale="90000"/>
           </a:bodyPr>
           <a:lstStyle/>
           <a:p>
             <a:r>
               <a:rPr lang="it-IT" sz="3600" dirty="0"/>
-              <a:t>Swap In</a:t>
+              <a:t>  Load frame from ELF</a:t>
             </a:r>
             <a:br>
               <a:rPr lang="it-IT" sz="4400" dirty="0"/>
@@ -16818,6 +16657,1736 @@
       </p:pic>
       <p:pic>
         <p:nvPicPr>
+          <p:cNvPr id="3" name="Immagine 2" descr="Immagine che contiene testo&#10;&#10;Descrizione generata automaticamente">
+            <a:extLst>
+              <a:ext uri="{FF2B5EF4-FFF2-40B4-BE49-F238E27FC236}">
+                <a16:creationId xmlns:a16="http://schemas.microsoft.com/office/drawing/2014/main" id="{27FE2C5F-B2EF-1F93-12B5-9D37B3D4BEE7}"/>
+              </a:ext>
+            </a:extLst>
+          </p:cNvPr>
+          <p:cNvPicPr>
+            <a:picLocks noChangeAspect="1"/>
+          </p:cNvPicPr>
+          <p:nvPr/>
+        </p:nvPicPr>
+        <p:blipFill>
+          <a:blip r:embed="rId3"/>
+          <a:stretch>
+            <a:fillRect/>
+          </a:stretch>
+        </p:blipFill>
+        <p:spPr>
+          <a:xfrm>
+            <a:off x="1800174" y="1287039"/>
+            <a:ext cx="6429426" cy="5234814"/>
+          </a:xfrm>
+          <a:prstGeom prst="rect">
+            <a:avLst/>
+          </a:prstGeom>
+        </p:spPr>
+      </p:pic>
+    </p:spTree>
+    <p:extLst>
+      <p:ext uri="{BB962C8B-B14F-4D97-AF65-F5344CB8AC3E}">
+        <p14:creationId xmlns:p14="http://schemas.microsoft.com/office/powerpoint/2010/main" val="1788696518"/>
+      </p:ext>
+    </p:extLst>
+  </p:cSld>
+  <p:clrMapOvr>
+    <a:masterClrMapping/>
+  </p:clrMapOvr>
+</p:sld>
+</file>
+
+<file path=ppt/slides/slide43.xml><?xml version="1.0" encoding="utf-8"?>
+<p:sld xmlns:a="http://schemas.openxmlformats.org/drawingml/2006/main" xmlns:r="http://schemas.openxmlformats.org/officeDocument/2006/relationships" xmlns:p="http://schemas.openxmlformats.org/presentationml/2006/main" showMasterSp="0">
+  <p:cSld>
+    <p:spTree>
+      <p:nvGrpSpPr>
+        <p:cNvPr id="1" name=""/>
+        <p:cNvGrpSpPr/>
+        <p:nvPr/>
+      </p:nvGrpSpPr>
+      <p:grpSpPr>
+        <a:xfrm>
+          <a:off x="0" y="0"/>
+          <a:ext cx="0" cy="0"/>
+          <a:chOff x="0" y="0"/>
+          <a:chExt cx="0" cy="0"/>
+        </a:xfrm>
+      </p:grpSpPr>
+      <p:sp>
+        <p:nvSpPr>
+          <p:cNvPr id="11" name="Titolo 10">
+            <a:extLst>
+              <a:ext uri="{FF2B5EF4-FFF2-40B4-BE49-F238E27FC236}">
+                <a16:creationId xmlns:a16="http://schemas.microsoft.com/office/drawing/2014/main" id="{467E9D4C-B62B-01CF-847C-A9EC44C81FD4}"/>
+              </a:ext>
+            </a:extLst>
+          </p:cNvPr>
+          <p:cNvSpPr>
+            <a:spLocks noGrp="1"/>
+          </p:cNvSpPr>
+          <p:nvPr>
+            <p:ph type="title"/>
+          </p:nvPr>
+        </p:nvSpPr>
+        <p:spPr>
+          <a:xfrm>
+            <a:off x="9007686" y="203706"/>
+            <a:ext cx="2772636" cy="1446550"/>
+          </a:xfrm>
+        </p:spPr>
+        <p:txBody>
+          <a:bodyPr>
+            <a:normAutofit/>
+          </a:bodyPr>
+          <a:lstStyle/>
+          <a:p>
+            <a:r>
+              <a:rPr lang="it-IT" sz="3600" dirty="0"/>
+              <a:t>VM Fault 3/4</a:t>
+            </a:r>
+            <a:br>
+              <a:rPr lang="it-IT" sz="4400" dirty="0"/>
+            </a:br>
+            <a:endParaRPr lang="it-IT" dirty="0"/>
+          </a:p>
+        </p:txBody>
+      </p:sp>
+      <p:cxnSp>
+        <p:nvCxnSpPr>
+          <p:cNvPr id="15" name="Connettore 1 14">
+            <a:extLst>
+              <a:ext uri="{FF2B5EF4-FFF2-40B4-BE49-F238E27FC236}">
+                <a16:creationId xmlns:a16="http://schemas.microsoft.com/office/drawing/2014/main" id="{C1F496B7-0E34-92F6-A787-9035D45D9534}"/>
+              </a:ext>
+            </a:extLst>
+          </p:cNvPr>
+          <p:cNvCxnSpPr>
+            <a:cxnSpLocks/>
+          </p:cNvCxnSpPr>
+          <p:nvPr/>
+        </p:nvCxnSpPr>
+        <p:spPr>
+          <a:xfrm>
+            <a:off x="2648197" y="914400"/>
+            <a:ext cx="9001497" cy="0"/>
+          </a:xfrm>
+          <a:prstGeom prst="line">
+            <a:avLst/>
+          </a:prstGeom>
+          <a:ln w="38100">
+            <a:solidFill>
+              <a:schemeClr val="tx1"/>
+            </a:solidFill>
+          </a:ln>
+        </p:spPr>
+        <p:style>
+          <a:lnRef idx="1">
+            <a:schemeClr val="accent1"/>
+          </a:lnRef>
+          <a:fillRef idx="0">
+            <a:schemeClr val="accent1"/>
+          </a:fillRef>
+          <a:effectRef idx="0">
+            <a:schemeClr val="accent1"/>
+          </a:effectRef>
+          <a:fontRef idx="minor">
+            <a:schemeClr val="tx1"/>
+          </a:fontRef>
+        </p:style>
+      </p:cxnSp>
+      <p:pic>
+        <p:nvPicPr>
+          <p:cNvPr id="20" name="Immagine 19">
+            <a:extLst>
+              <a:ext uri="{FF2B5EF4-FFF2-40B4-BE49-F238E27FC236}">
+                <a16:creationId xmlns:a16="http://schemas.microsoft.com/office/drawing/2014/main" id="{F914F839-013B-DAE5-4A35-15CE4EC1BA01}"/>
+              </a:ext>
+            </a:extLst>
+          </p:cNvPr>
+          <p:cNvPicPr>
+            <a:picLocks noChangeAspect="1"/>
+          </p:cNvPicPr>
+          <p:nvPr/>
+        </p:nvPicPr>
+        <p:blipFill>
+          <a:blip r:embed="rId2"/>
+          <a:stretch>
+            <a:fillRect/>
+          </a:stretch>
+        </p:blipFill>
+        <p:spPr>
+          <a:xfrm>
+            <a:off x="355429" y="203706"/>
+            <a:ext cx="2292768" cy="1083333"/>
+          </a:xfrm>
+          <a:prstGeom prst="rect">
+            <a:avLst/>
+          </a:prstGeom>
+        </p:spPr>
+      </p:pic>
+      <p:pic>
+        <p:nvPicPr>
+          <p:cNvPr id="4" name="Immagine 3">
+            <a:extLst>
+              <a:ext uri="{FF2B5EF4-FFF2-40B4-BE49-F238E27FC236}">
+                <a16:creationId xmlns:a16="http://schemas.microsoft.com/office/drawing/2014/main" id="{E73C62F4-9A61-E1AA-B7CD-F71B3DAE018C}"/>
+              </a:ext>
+            </a:extLst>
+          </p:cNvPr>
+          <p:cNvPicPr>
+            <a:picLocks noChangeAspect="1"/>
+          </p:cNvPicPr>
+          <p:nvPr/>
+        </p:nvPicPr>
+        <p:blipFill>
+          <a:blip r:embed="rId3"/>
+          <a:stretch>
+            <a:fillRect/>
+          </a:stretch>
+        </p:blipFill>
+        <p:spPr>
+          <a:xfrm>
+            <a:off x="1595251" y="1625095"/>
+            <a:ext cx="9413175" cy="4881491"/>
+          </a:xfrm>
+          <a:prstGeom prst="rect">
+            <a:avLst/>
+          </a:prstGeom>
+        </p:spPr>
+      </p:pic>
+      <p:pic>
+        <p:nvPicPr>
+          <p:cNvPr id="3" name="Immagine 2">
+            <a:extLst>
+              <a:ext uri="{FF2B5EF4-FFF2-40B4-BE49-F238E27FC236}">
+                <a16:creationId xmlns:a16="http://schemas.microsoft.com/office/drawing/2014/main" id="{2D4A5EA6-3100-B00D-221E-B65B14126882}"/>
+              </a:ext>
+            </a:extLst>
+          </p:cNvPr>
+          <p:cNvPicPr>
+            <a:picLocks noChangeAspect="1"/>
+          </p:cNvPicPr>
+          <p:nvPr/>
+        </p:nvPicPr>
+        <p:blipFill>
+          <a:blip r:embed="rId4"/>
+          <a:stretch>
+            <a:fillRect/>
+          </a:stretch>
+        </p:blipFill>
+        <p:spPr>
+          <a:xfrm>
+            <a:off x="5531483" y="5664595"/>
+            <a:ext cx="1224159" cy="912932"/>
+          </a:xfrm>
+          <a:prstGeom prst="rect">
+            <a:avLst/>
+          </a:prstGeom>
+        </p:spPr>
+      </p:pic>
+    </p:spTree>
+    <p:extLst>
+      <p:ext uri="{BB962C8B-B14F-4D97-AF65-F5344CB8AC3E}">
+        <p14:creationId xmlns:p14="http://schemas.microsoft.com/office/powerpoint/2010/main" val="4289977724"/>
+      </p:ext>
+    </p:extLst>
+  </p:cSld>
+  <p:clrMapOvr>
+    <a:masterClrMapping/>
+  </p:clrMapOvr>
+</p:sld>
+</file>
+
+<file path=ppt/slides/slide44.xml><?xml version="1.0" encoding="utf-8"?>
+<p:sld xmlns:a="http://schemas.openxmlformats.org/drawingml/2006/main" xmlns:r="http://schemas.openxmlformats.org/officeDocument/2006/relationships" xmlns:p="http://schemas.openxmlformats.org/presentationml/2006/main" showMasterSp="0">
+  <p:cSld>
+    <p:spTree>
+      <p:nvGrpSpPr>
+        <p:cNvPr id="1" name=""/>
+        <p:cNvGrpSpPr/>
+        <p:nvPr/>
+      </p:nvGrpSpPr>
+      <p:grpSpPr>
+        <a:xfrm>
+          <a:off x="0" y="0"/>
+          <a:ext cx="0" cy="0"/>
+          <a:chOff x="0" y="0"/>
+          <a:chExt cx="0" cy="0"/>
+        </a:xfrm>
+      </p:grpSpPr>
+      <p:sp>
+        <p:nvSpPr>
+          <p:cNvPr id="11" name="Titolo 10">
+            <a:extLst>
+              <a:ext uri="{FF2B5EF4-FFF2-40B4-BE49-F238E27FC236}">
+                <a16:creationId xmlns:a16="http://schemas.microsoft.com/office/drawing/2014/main" id="{467E9D4C-B62B-01CF-847C-A9EC44C81FD4}"/>
+              </a:ext>
+            </a:extLst>
+          </p:cNvPr>
+          <p:cNvSpPr>
+            <a:spLocks noGrp="1"/>
+          </p:cNvSpPr>
+          <p:nvPr>
+            <p:ph type="title"/>
+          </p:nvPr>
+        </p:nvSpPr>
+        <p:spPr>
+          <a:xfrm>
+            <a:off x="8502555" y="203706"/>
+            <a:ext cx="3277767" cy="1446550"/>
+          </a:xfrm>
+        </p:spPr>
+        <p:txBody>
+          <a:bodyPr>
+            <a:normAutofit/>
+          </a:bodyPr>
+          <a:lstStyle/>
+          <a:p>
+            <a:r>
+              <a:rPr lang="it-IT" sz="3600" dirty="0"/>
+              <a:t>Swap IN 1/2</a:t>
+            </a:r>
+            <a:br>
+              <a:rPr lang="it-IT" sz="4400" dirty="0"/>
+            </a:br>
+            <a:endParaRPr lang="it-IT" dirty="0"/>
+          </a:p>
+        </p:txBody>
+      </p:sp>
+      <p:cxnSp>
+        <p:nvCxnSpPr>
+          <p:cNvPr id="15" name="Connettore 1 14">
+            <a:extLst>
+              <a:ext uri="{FF2B5EF4-FFF2-40B4-BE49-F238E27FC236}">
+                <a16:creationId xmlns:a16="http://schemas.microsoft.com/office/drawing/2014/main" id="{C1F496B7-0E34-92F6-A787-9035D45D9534}"/>
+              </a:ext>
+            </a:extLst>
+          </p:cNvPr>
+          <p:cNvCxnSpPr>
+            <a:cxnSpLocks/>
+          </p:cNvCxnSpPr>
+          <p:nvPr/>
+        </p:nvCxnSpPr>
+        <p:spPr>
+          <a:xfrm>
+            <a:off x="2648197" y="914400"/>
+            <a:ext cx="9001497" cy="0"/>
+          </a:xfrm>
+          <a:prstGeom prst="line">
+            <a:avLst/>
+          </a:prstGeom>
+          <a:ln w="38100">
+            <a:solidFill>
+              <a:schemeClr val="tx1"/>
+            </a:solidFill>
+          </a:ln>
+        </p:spPr>
+        <p:style>
+          <a:lnRef idx="1">
+            <a:schemeClr val="accent1"/>
+          </a:lnRef>
+          <a:fillRef idx="0">
+            <a:schemeClr val="accent1"/>
+          </a:fillRef>
+          <a:effectRef idx="0">
+            <a:schemeClr val="accent1"/>
+          </a:effectRef>
+          <a:fontRef idx="minor">
+            <a:schemeClr val="tx1"/>
+          </a:fontRef>
+        </p:style>
+      </p:cxnSp>
+      <p:pic>
+        <p:nvPicPr>
+          <p:cNvPr id="20" name="Immagine 19">
+            <a:extLst>
+              <a:ext uri="{FF2B5EF4-FFF2-40B4-BE49-F238E27FC236}">
+                <a16:creationId xmlns:a16="http://schemas.microsoft.com/office/drawing/2014/main" id="{F914F839-013B-DAE5-4A35-15CE4EC1BA01}"/>
+              </a:ext>
+            </a:extLst>
+          </p:cNvPr>
+          <p:cNvPicPr>
+            <a:picLocks noChangeAspect="1"/>
+          </p:cNvPicPr>
+          <p:nvPr/>
+        </p:nvPicPr>
+        <p:blipFill>
+          <a:blip r:embed="rId2"/>
+          <a:stretch>
+            <a:fillRect/>
+          </a:stretch>
+        </p:blipFill>
+        <p:spPr>
+          <a:xfrm>
+            <a:off x="355429" y="203706"/>
+            <a:ext cx="2292768" cy="1083333"/>
+          </a:xfrm>
+          <a:prstGeom prst="rect">
+            <a:avLst/>
+          </a:prstGeom>
+        </p:spPr>
+      </p:pic>
+      <p:pic>
+        <p:nvPicPr>
+          <p:cNvPr id="3" name="Immagine 2" descr="Immagine che contiene diagramma&#10;&#10;Descrizione generata automaticamente">
+            <a:extLst>
+              <a:ext uri="{FF2B5EF4-FFF2-40B4-BE49-F238E27FC236}">
+                <a16:creationId xmlns:a16="http://schemas.microsoft.com/office/drawing/2014/main" id="{7FB349B6-AEB3-82D2-5579-DE9904BBE6D1}"/>
+              </a:ext>
+            </a:extLst>
+          </p:cNvPr>
+          <p:cNvPicPr>
+            <a:picLocks noChangeAspect="1"/>
+          </p:cNvPicPr>
+          <p:nvPr/>
+        </p:nvPicPr>
+        <p:blipFill>
+          <a:blip r:embed="rId3"/>
+          <a:stretch>
+            <a:fillRect/>
+          </a:stretch>
+        </p:blipFill>
+        <p:spPr>
+          <a:xfrm>
+            <a:off x="4388572" y="1287039"/>
+            <a:ext cx="4161651" cy="5089939"/>
+          </a:xfrm>
+          <a:prstGeom prst="rect">
+            <a:avLst/>
+          </a:prstGeom>
+        </p:spPr>
+      </p:pic>
+    </p:spTree>
+    <p:extLst>
+      <p:ext uri="{BB962C8B-B14F-4D97-AF65-F5344CB8AC3E}">
+        <p14:creationId xmlns:p14="http://schemas.microsoft.com/office/powerpoint/2010/main" val="1283932240"/>
+      </p:ext>
+    </p:extLst>
+  </p:cSld>
+  <p:clrMapOvr>
+    <a:masterClrMapping/>
+  </p:clrMapOvr>
+</p:sld>
+</file>
+
+<file path=ppt/slides/slide45.xml><?xml version="1.0" encoding="utf-8"?>
+<p:sld xmlns:a="http://schemas.openxmlformats.org/drawingml/2006/main" xmlns:r="http://schemas.openxmlformats.org/officeDocument/2006/relationships" xmlns:p="http://schemas.openxmlformats.org/presentationml/2006/main" showMasterSp="0">
+  <p:cSld>
+    <p:spTree>
+      <p:nvGrpSpPr>
+        <p:cNvPr id="1" name=""/>
+        <p:cNvGrpSpPr/>
+        <p:nvPr/>
+      </p:nvGrpSpPr>
+      <p:grpSpPr>
+        <a:xfrm>
+          <a:off x="0" y="0"/>
+          <a:ext cx="0" cy="0"/>
+          <a:chOff x="0" y="0"/>
+          <a:chExt cx="0" cy="0"/>
+        </a:xfrm>
+      </p:grpSpPr>
+      <p:sp>
+        <p:nvSpPr>
+          <p:cNvPr id="11" name="Titolo 10">
+            <a:extLst>
+              <a:ext uri="{FF2B5EF4-FFF2-40B4-BE49-F238E27FC236}">
+                <a16:creationId xmlns:a16="http://schemas.microsoft.com/office/drawing/2014/main" id="{467E9D4C-B62B-01CF-847C-A9EC44C81FD4}"/>
+              </a:ext>
+            </a:extLst>
+          </p:cNvPr>
+          <p:cNvSpPr>
+            <a:spLocks noGrp="1"/>
+          </p:cNvSpPr>
+          <p:nvPr>
+            <p:ph type="title"/>
+          </p:nvPr>
+        </p:nvSpPr>
+        <p:spPr>
+          <a:xfrm>
+            <a:off x="8502555" y="203706"/>
+            <a:ext cx="3277767" cy="1446550"/>
+          </a:xfrm>
+        </p:spPr>
+        <p:txBody>
+          <a:bodyPr>
+            <a:normAutofit/>
+          </a:bodyPr>
+          <a:lstStyle/>
+          <a:p>
+            <a:r>
+              <a:rPr lang="it-IT" sz="3600" dirty="0"/>
+              <a:t>Swap IN 2/2</a:t>
+            </a:r>
+            <a:br>
+              <a:rPr lang="it-IT" sz="4400" dirty="0"/>
+            </a:br>
+            <a:endParaRPr lang="it-IT" dirty="0"/>
+          </a:p>
+        </p:txBody>
+      </p:sp>
+      <p:cxnSp>
+        <p:nvCxnSpPr>
+          <p:cNvPr id="15" name="Connettore 1 14">
+            <a:extLst>
+              <a:ext uri="{FF2B5EF4-FFF2-40B4-BE49-F238E27FC236}">
+                <a16:creationId xmlns:a16="http://schemas.microsoft.com/office/drawing/2014/main" id="{C1F496B7-0E34-92F6-A787-9035D45D9534}"/>
+              </a:ext>
+            </a:extLst>
+          </p:cNvPr>
+          <p:cNvCxnSpPr>
+            <a:cxnSpLocks/>
+          </p:cNvCxnSpPr>
+          <p:nvPr/>
+        </p:nvCxnSpPr>
+        <p:spPr>
+          <a:xfrm>
+            <a:off x="2648197" y="914400"/>
+            <a:ext cx="9001497" cy="0"/>
+          </a:xfrm>
+          <a:prstGeom prst="line">
+            <a:avLst/>
+          </a:prstGeom>
+          <a:ln w="38100">
+            <a:solidFill>
+              <a:schemeClr val="tx1"/>
+            </a:solidFill>
+          </a:ln>
+        </p:spPr>
+        <p:style>
+          <a:lnRef idx="1">
+            <a:schemeClr val="accent1"/>
+          </a:lnRef>
+          <a:fillRef idx="0">
+            <a:schemeClr val="accent1"/>
+          </a:fillRef>
+          <a:effectRef idx="0">
+            <a:schemeClr val="accent1"/>
+          </a:effectRef>
+          <a:fontRef idx="minor">
+            <a:schemeClr val="tx1"/>
+          </a:fontRef>
+        </p:style>
+      </p:cxnSp>
+      <p:pic>
+        <p:nvPicPr>
+          <p:cNvPr id="20" name="Immagine 19">
+            <a:extLst>
+              <a:ext uri="{FF2B5EF4-FFF2-40B4-BE49-F238E27FC236}">
+                <a16:creationId xmlns:a16="http://schemas.microsoft.com/office/drawing/2014/main" id="{F914F839-013B-DAE5-4A35-15CE4EC1BA01}"/>
+              </a:ext>
+            </a:extLst>
+          </p:cNvPr>
+          <p:cNvPicPr>
+            <a:picLocks noChangeAspect="1"/>
+          </p:cNvPicPr>
+          <p:nvPr/>
+        </p:nvPicPr>
+        <p:blipFill>
+          <a:blip r:embed="rId2"/>
+          <a:stretch>
+            <a:fillRect/>
+          </a:stretch>
+        </p:blipFill>
+        <p:spPr>
+          <a:xfrm>
+            <a:off x="355429" y="203706"/>
+            <a:ext cx="2292768" cy="1083333"/>
+          </a:xfrm>
+          <a:prstGeom prst="rect">
+            <a:avLst/>
+          </a:prstGeom>
+        </p:spPr>
+      </p:pic>
+      <p:sp>
+        <p:nvSpPr>
+          <p:cNvPr id="4" name="Segnaposto contenuto 1">
+            <a:extLst>
+              <a:ext uri="{FF2B5EF4-FFF2-40B4-BE49-F238E27FC236}">
+                <a16:creationId xmlns:a16="http://schemas.microsoft.com/office/drawing/2014/main" id="{EE5093D1-1437-8E8E-DEB0-6D7CAA3FB0A9}"/>
+              </a:ext>
+            </a:extLst>
+          </p:cNvPr>
+          <p:cNvSpPr txBox="1">
+            <a:spLocks/>
+          </p:cNvSpPr>
+          <p:nvPr/>
+        </p:nvSpPr>
+        <p:spPr>
+          <a:xfrm>
+            <a:off x="470147" y="1621580"/>
+            <a:ext cx="7653436" cy="4527425"/>
+          </a:xfrm>
+          <a:prstGeom prst="rect">
+            <a:avLst/>
+          </a:prstGeom>
+        </p:spPr>
+        <p:txBody>
+          <a:bodyPr>
+            <a:normAutofit/>
+          </a:bodyPr>
+          <a:lstStyle>
+            <a:lvl1pPr marL="228600" indent="-228600" algn="l" defTabSz="914400" rtl="0" eaLnBrk="1" latinLnBrk="0" hangingPunct="1">
+              <a:lnSpc>
+                <a:spcPct val="100000"/>
+              </a:lnSpc>
+              <a:spcBef>
+                <a:spcPts val="1000"/>
+              </a:spcBef>
+              <a:buFont typeface="System Font Regular"/>
+              <a:buChar char="–"/>
+              <a:defRPr sz="2400" b="0" i="0" kern="1200">
+                <a:solidFill>
+                  <a:schemeClr val="tx1"/>
+                </a:solidFill>
+                <a:latin typeface="+mn-lt"/>
+                <a:ea typeface="+mn-ea"/>
+                <a:cs typeface="+mn-cs"/>
+              </a:defRPr>
+            </a:lvl1pPr>
+            <a:lvl2pPr marL="685800" indent="-228600" algn="l" defTabSz="914400" rtl="0" eaLnBrk="1" latinLnBrk="0" hangingPunct="1">
+              <a:lnSpc>
+                <a:spcPct val="100000"/>
+              </a:lnSpc>
+              <a:spcBef>
+                <a:spcPts val="500"/>
+              </a:spcBef>
+              <a:buFont typeface="System Font Regular"/>
+              <a:buChar char="–"/>
+              <a:defRPr sz="2000" b="0" i="0" kern="1200">
+                <a:solidFill>
+                  <a:schemeClr val="tx1"/>
+                </a:solidFill>
+                <a:latin typeface="+mn-lt"/>
+                <a:ea typeface="+mn-ea"/>
+                <a:cs typeface="+mn-cs"/>
+              </a:defRPr>
+            </a:lvl2pPr>
+            <a:lvl3pPr marL="1143000" indent="-228600" algn="l" defTabSz="914400" rtl="0" eaLnBrk="1" latinLnBrk="0" hangingPunct="1">
+              <a:lnSpc>
+                <a:spcPct val="100000"/>
+              </a:lnSpc>
+              <a:spcBef>
+                <a:spcPts val="500"/>
+              </a:spcBef>
+              <a:buFont typeface="System Font Regular"/>
+              <a:buChar char="–"/>
+              <a:defRPr sz="1800" b="0" i="0" kern="1200">
+                <a:solidFill>
+                  <a:schemeClr val="tx1"/>
+                </a:solidFill>
+                <a:latin typeface="+mn-lt"/>
+                <a:ea typeface="+mn-ea"/>
+                <a:cs typeface="+mn-cs"/>
+              </a:defRPr>
+            </a:lvl3pPr>
+            <a:lvl4pPr marL="1600200" indent="-228600" algn="l" defTabSz="914400" rtl="0" eaLnBrk="1" latinLnBrk="0" hangingPunct="1">
+              <a:lnSpc>
+                <a:spcPct val="100000"/>
+              </a:lnSpc>
+              <a:spcBef>
+                <a:spcPts val="500"/>
+              </a:spcBef>
+              <a:buFont typeface="System Font Regular"/>
+              <a:buChar char="–"/>
+              <a:defRPr sz="1600" b="0" i="0" kern="1200">
+                <a:solidFill>
+                  <a:schemeClr val="tx1"/>
+                </a:solidFill>
+                <a:latin typeface="+mn-lt"/>
+                <a:ea typeface="+mn-ea"/>
+                <a:cs typeface="+mn-cs"/>
+              </a:defRPr>
+            </a:lvl4pPr>
+            <a:lvl5pPr marL="2057400" indent="-228600" algn="l" defTabSz="914400" rtl="0" eaLnBrk="1" latinLnBrk="0" hangingPunct="1">
+              <a:lnSpc>
+                <a:spcPct val="100000"/>
+              </a:lnSpc>
+              <a:spcBef>
+                <a:spcPts val="500"/>
+              </a:spcBef>
+              <a:buFont typeface="System Font Regular"/>
+              <a:buChar char="–"/>
+              <a:defRPr sz="1600" b="0" i="0" kern="1200">
+                <a:solidFill>
+                  <a:schemeClr val="tx1"/>
+                </a:solidFill>
+                <a:latin typeface="+mn-lt"/>
+                <a:ea typeface="+mn-ea"/>
+                <a:cs typeface="+mn-cs"/>
+              </a:defRPr>
+            </a:lvl5pPr>
+            <a:lvl6pPr marL="2514600" indent="-228600" algn="l" defTabSz="914400" rtl="0" eaLnBrk="1" latinLnBrk="0" hangingPunct="1">
+              <a:lnSpc>
+                <a:spcPct val="90000"/>
+              </a:lnSpc>
+              <a:spcBef>
+                <a:spcPts val="500"/>
+              </a:spcBef>
+              <a:buFont typeface="Arial" panose="020B0604020202020204" pitchFamily="34" charset="0"/>
+              <a:buChar char="•"/>
+              <a:defRPr sz="1800" kern="1200">
+                <a:solidFill>
+                  <a:schemeClr val="tx1"/>
+                </a:solidFill>
+                <a:latin typeface="+mn-lt"/>
+                <a:ea typeface="+mn-ea"/>
+                <a:cs typeface="+mn-cs"/>
+              </a:defRPr>
+            </a:lvl6pPr>
+            <a:lvl7pPr marL="2971800" indent="-228600" algn="l" defTabSz="914400" rtl="0" eaLnBrk="1" latinLnBrk="0" hangingPunct="1">
+              <a:lnSpc>
+                <a:spcPct val="90000"/>
+              </a:lnSpc>
+              <a:spcBef>
+                <a:spcPts val="500"/>
+              </a:spcBef>
+              <a:buFont typeface="Arial" panose="020B0604020202020204" pitchFamily="34" charset="0"/>
+              <a:buChar char="•"/>
+              <a:defRPr sz="1800" kern="1200">
+                <a:solidFill>
+                  <a:schemeClr val="tx1"/>
+                </a:solidFill>
+                <a:latin typeface="+mn-lt"/>
+                <a:ea typeface="+mn-ea"/>
+                <a:cs typeface="+mn-cs"/>
+              </a:defRPr>
+            </a:lvl7pPr>
+            <a:lvl8pPr marL="3429000" indent="-228600" algn="l" defTabSz="914400" rtl="0" eaLnBrk="1" latinLnBrk="0" hangingPunct="1">
+              <a:lnSpc>
+                <a:spcPct val="90000"/>
+              </a:lnSpc>
+              <a:spcBef>
+                <a:spcPts val="500"/>
+              </a:spcBef>
+              <a:buFont typeface="Arial" panose="020B0604020202020204" pitchFamily="34" charset="0"/>
+              <a:buChar char="•"/>
+              <a:defRPr sz="1800" kern="1200">
+                <a:solidFill>
+                  <a:schemeClr val="tx1"/>
+                </a:solidFill>
+                <a:latin typeface="+mn-lt"/>
+                <a:ea typeface="+mn-ea"/>
+                <a:cs typeface="+mn-cs"/>
+              </a:defRPr>
+            </a:lvl8pPr>
+            <a:lvl9pPr marL="3886200" indent="-228600" algn="l" defTabSz="914400" rtl="0" eaLnBrk="1" latinLnBrk="0" hangingPunct="1">
+              <a:lnSpc>
+                <a:spcPct val="90000"/>
+              </a:lnSpc>
+              <a:spcBef>
+                <a:spcPts val="500"/>
+              </a:spcBef>
+              <a:buFont typeface="Arial" panose="020B0604020202020204" pitchFamily="34" charset="0"/>
+              <a:buChar char="•"/>
+              <a:defRPr sz="1800" kern="1200">
+                <a:solidFill>
+                  <a:schemeClr val="tx1"/>
+                </a:solidFill>
+                <a:latin typeface="+mn-lt"/>
+                <a:ea typeface="+mn-ea"/>
+                <a:cs typeface="+mn-cs"/>
+              </a:defRPr>
+            </a:lvl9pPr>
+          </a:lstStyle>
+          <a:p>
+            <a:pPr>
+              <a:buFont typeface="Arial" panose="020B0604020202020204" pitchFamily="34" charset="0"/>
+              <a:buChar char="•"/>
+            </a:pPr>
+            <a:r>
+              <a:rPr lang="it-IT" dirty="0" err="1">
+                <a:solidFill>
+                  <a:schemeClr val="tx2"/>
+                </a:solidFill>
+              </a:rPr>
+              <a:t>Search_swapped_frame</a:t>
+            </a:r>
+            <a:r>
+              <a:rPr lang="it-IT" dirty="0">
+                <a:solidFill>
+                  <a:schemeClr val="tx2"/>
+                </a:solidFill>
+              </a:rPr>
+              <a:t>(</a:t>
+            </a:r>
+            <a:r>
+              <a:rPr lang="it-IT" dirty="0" err="1">
+                <a:solidFill>
+                  <a:schemeClr val="accent1">
+                    <a:lumMod val="20000"/>
+                    <a:lumOff val="80000"/>
+                  </a:schemeClr>
+                </a:solidFill>
+              </a:rPr>
+              <a:t>vaddr_t</a:t>
+            </a:r>
+            <a:r>
+              <a:rPr lang="it-IT" dirty="0">
+                <a:solidFill>
+                  <a:schemeClr val="accent1">
+                    <a:lumMod val="20000"/>
+                    <a:lumOff val="80000"/>
+                  </a:schemeClr>
+                </a:solidFill>
+              </a:rPr>
+              <a:t> </a:t>
+            </a:r>
+            <a:r>
+              <a:rPr lang="it-IT" dirty="0" err="1"/>
+              <a:t>vaddr</a:t>
+            </a:r>
+            <a:r>
+              <a:rPr lang="it-IT" dirty="0">
+                <a:solidFill>
+                  <a:schemeClr val="tx2"/>
+                </a:solidFill>
+              </a:rPr>
+              <a:t>)</a:t>
+            </a:r>
+          </a:p>
+          <a:p>
+            <a:pPr marL="0" indent="0">
+              <a:buNone/>
+            </a:pPr>
+            <a:endParaRPr lang="it-IT" dirty="0">
+              <a:solidFill>
+                <a:schemeClr val="tx2"/>
+              </a:solidFill>
+            </a:endParaRPr>
+          </a:p>
+          <a:p>
+            <a:pPr>
+              <a:buFont typeface="Arial" panose="020B0604020202020204" pitchFamily="34" charset="0"/>
+              <a:buChar char="•"/>
+            </a:pPr>
+            <a:endParaRPr lang="it-IT" dirty="0">
+              <a:solidFill>
+                <a:schemeClr val="tx2"/>
+              </a:solidFill>
+            </a:endParaRPr>
+          </a:p>
+          <a:p>
+            <a:pPr>
+              <a:buFont typeface="Arial" panose="020B0604020202020204" pitchFamily="34" charset="0"/>
+              <a:buChar char="•"/>
+            </a:pPr>
+            <a:endParaRPr lang="it-IT" dirty="0">
+              <a:solidFill>
+                <a:schemeClr val="tx2"/>
+              </a:solidFill>
+            </a:endParaRPr>
+          </a:p>
+          <a:p>
+            <a:pPr>
+              <a:buFont typeface="Arial" panose="020B0604020202020204" pitchFamily="34" charset="0"/>
+              <a:buChar char="•"/>
+            </a:pPr>
+            <a:endParaRPr lang="it-IT" dirty="0">
+              <a:solidFill>
+                <a:schemeClr val="tx2"/>
+              </a:solidFill>
+            </a:endParaRPr>
+          </a:p>
+          <a:p>
+            <a:pPr>
+              <a:buFont typeface="Arial" panose="020B0604020202020204" pitchFamily="34" charset="0"/>
+              <a:buChar char="•"/>
+            </a:pPr>
+            <a:endParaRPr lang="it-IT" dirty="0">
+              <a:solidFill>
+                <a:schemeClr val="tx2"/>
+              </a:solidFill>
+            </a:endParaRPr>
+          </a:p>
+          <a:p>
+            <a:pPr>
+              <a:buFont typeface="Arial" panose="020B0604020202020204" pitchFamily="34" charset="0"/>
+              <a:buChar char="•"/>
+            </a:pPr>
+            <a:r>
+              <a:rPr lang="it-IT" dirty="0" err="1">
+                <a:solidFill>
+                  <a:schemeClr val="tx2"/>
+                </a:solidFill>
+              </a:rPr>
+              <a:t>Swappage_IN</a:t>
+            </a:r>
+            <a:r>
+              <a:rPr lang="it-IT" dirty="0">
+                <a:solidFill>
+                  <a:schemeClr val="tx2"/>
+                </a:solidFill>
+              </a:rPr>
+              <a:t>(</a:t>
+            </a:r>
+            <a:r>
+              <a:rPr lang="it-IT" dirty="0" err="1">
+                <a:solidFill>
+                  <a:schemeClr val="accent1">
+                    <a:lumMod val="20000"/>
+                    <a:lumOff val="80000"/>
+                  </a:schemeClr>
+                </a:solidFill>
+              </a:rPr>
+              <a:t>vaddr_t</a:t>
+            </a:r>
+            <a:r>
+              <a:rPr lang="it-IT" dirty="0">
+                <a:solidFill>
+                  <a:schemeClr val="accent1">
+                    <a:lumMod val="20000"/>
+                    <a:lumOff val="80000"/>
+                  </a:schemeClr>
+                </a:solidFill>
+              </a:rPr>
+              <a:t> </a:t>
+            </a:r>
+            <a:r>
+              <a:rPr lang="it-IT" dirty="0" err="1"/>
+              <a:t>vaddr</a:t>
+            </a:r>
+            <a:r>
+              <a:rPr lang="it-IT" dirty="0"/>
+              <a:t>, </a:t>
+            </a:r>
+            <a:r>
+              <a:rPr lang="it-IT" dirty="0" err="1">
+                <a:solidFill>
+                  <a:schemeClr val="accent1">
+                    <a:lumMod val="20000"/>
+                    <a:lumOff val="80000"/>
+                  </a:schemeClr>
+                </a:solidFill>
+              </a:rPr>
+              <a:t>off_t</a:t>
+            </a:r>
+            <a:r>
+              <a:rPr lang="it-IT" dirty="0">
+                <a:solidFill>
+                  <a:schemeClr val="accent1">
+                    <a:lumMod val="20000"/>
+                    <a:lumOff val="80000"/>
+                  </a:schemeClr>
+                </a:solidFill>
+              </a:rPr>
+              <a:t> </a:t>
+            </a:r>
+            <a:r>
+              <a:rPr lang="it-IT" dirty="0" err="1"/>
+              <a:t>swapaddr</a:t>
+            </a:r>
+            <a:r>
+              <a:rPr lang="it-IT" dirty="0">
+                <a:solidFill>
+                  <a:schemeClr val="tx2"/>
+                </a:solidFill>
+              </a:rPr>
+              <a:t>)</a:t>
+            </a:r>
+            <a:endParaRPr lang="it-IT" dirty="0"/>
+          </a:p>
+          <a:p>
+            <a:pPr marL="0" indent="0">
+              <a:buFont typeface="System Font Regular"/>
+              <a:buNone/>
+            </a:pPr>
+            <a:endParaRPr lang="it-IT" dirty="0"/>
+          </a:p>
+          <a:p>
+            <a:pPr marL="0" indent="0">
+              <a:buFont typeface="System Font Regular"/>
+              <a:buNone/>
+            </a:pPr>
+            <a:endParaRPr lang="it-IT" dirty="0"/>
+          </a:p>
+          <a:p>
+            <a:pPr marL="0" indent="0">
+              <a:buFont typeface="System Font Regular"/>
+              <a:buNone/>
+            </a:pPr>
+            <a:endParaRPr lang="it-IT" dirty="0"/>
+          </a:p>
+          <a:p>
+            <a:pPr marL="0" indent="0">
+              <a:buFont typeface="System Font Regular"/>
+              <a:buNone/>
+            </a:pPr>
+            <a:endParaRPr lang="it-IT" dirty="0"/>
+          </a:p>
+        </p:txBody>
+      </p:sp>
+      <p:pic>
+        <p:nvPicPr>
+          <p:cNvPr id="6" name="Immagine 5">
+            <a:extLst>
+              <a:ext uri="{FF2B5EF4-FFF2-40B4-BE49-F238E27FC236}">
+                <a16:creationId xmlns:a16="http://schemas.microsoft.com/office/drawing/2014/main" id="{86DBC7D7-B0E0-AEC9-A93E-B31BFE13B779}"/>
+              </a:ext>
+            </a:extLst>
+          </p:cNvPr>
+          <p:cNvPicPr>
+            <a:picLocks noChangeAspect="1"/>
+          </p:cNvPicPr>
+          <p:nvPr/>
+        </p:nvPicPr>
+        <p:blipFill>
+          <a:blip r:embed="rId3"/>
+          <a:stretch>
+            <a:fillRect/>
+          </a:stretch>
+        </p:blipFill>
+        <p:spPr>
+          <a:xfrm>
+            <a:off x="1993900" y="5206494"/>
+            <a:ext cx="4102100" cy="1447800"/>
+          </a:xfrm>
+          <a:prstGeom prst="rect">
+            <a:avLst/>
+          </a:prstGeom>
+          <a:ln>
+            <a:solidFill>
+              <a:schemeClr val="bg1">
+                <a:lumMod val="75000"/>
+              </a:schemeClr>
+            </a:solidFill>
+          </a:ln>
+        </p:spPr>
+      </p:pic>
+      <p:pic>
+        <p:nvPicPr>
+          <p:cNvPr id="8" name="Immagine 7" descr="Immagine che contiene testo&#10;&#10;Descrizione generata automaticamente">
+            <a:extLst>
+              <a:ext uri="{FF2B5EF4-FFF2-40B4-BE49-F238E27FC236}">
+                <a16:creationId xmlns:a16="http://schemas.microsoft.com/office/drawing/2014/main" id="{3C0DFADA-6DBF-1E09-5C4D-930515C6A7B7}"/>
+              </a:ext>
+            </a:extLst>
+          </p:cNvPr>
+          <p:cNvPicPr>
+            <a:picLocks noChangeAspect="1"/>
+          </p:cNvPicPr>
+          <p:nvPr/>
+        </p:nvPicPr>
+        <p:blipFill>
+          <a:blip r:embed="rId4"/>
+          <a:stretch>
+            <a:fillRect/>
+          </a:stretch>
+        </p:blipFill>
+        <p:spPr>
+          <a:xfrm>
+            <a:off x="1993900" y="2274110"/>
+            <a:ext cx="7772400" cy="2225205"/>
+          </a:xfrm>
+          <a:prstGeom prst="rect">
+            <a:avLst/>
+          </a:prstGeom>
+          <a:ln>
+            <a:solidFill>
+              <a:schemeClr val="bg1">
+                <a:lumMod val="75000"/>
+              </a:schemeClr>
+            </a:solidFill>
+          </a:ln>
+        </p:spPr>
+      </p:pic>
+    </p:spTree>
+    <p:extLst>
+      <p:ext uri="{BB962C8B-B14F-4D97-AF65-F5344CB8AC3E}">
+        <p14:creationId xmlns:p14="http://schemas.microsoft.com/office/powerpoint/2010/main" val="4037566204"/>
+      </p:ext>
+    </p:extLst>
+  </p:cSld>
+  <p:clrMapOvr>
+    <a:masterClrMapping/>
+  </p:clrMapOvr>
+</p:sld>
+</file>
+
+<file path=ppt/slides/slide46.xml><?xml version="1.0" encoding="utf-8"?>
+<p:sld xmlns:a="http://schemas.openxmlformats.org/drawingml/2006/main" xmlns:r="http://schemas.openxmlformats.org/officeDocument/2006/relationships" xmlns:p="http://schemas.openxmlformats.org/presentationml/2006/main" showMasterSp="0">
+  <p:cSld>
+    <p:spTree>
+      <p:nvGrpSpPr>
+        <p:cNvPr id="1" name=""/>
+        <p:cNvGrpSpPr/>
+        <p:nvPr/>
+      </p:nvGrpSpPr>
+      <p:grpSpPr>
+        <a:xfrm>
+          <a:off x="0" y="0"/>
+          <a:ext cx="0" cy="0"/>
+          <a:chOff x="0" y="0"/>
+          <a:chExt cx="0" cy="0"/>
+        </a:xfrm>
+      </p:grpSpPr>
+      <p:sp>
+        <p:nvSpPr>
+          <p:cNvPr id="11" name="Titolo 10">
+            <a:extLst>
+              <a:ext uri="{FF2B5EF4-FFF2-40B4-BE49-F238E27FC236}">
+                <a16:creationId xmlns:a16="http://schemas.microsoft.com/office/drawing/2014/main" id="{467E9D4C-B62B-01CF-847C-A9EC44C81FD4}"/>
+              </a:ext>
+            </a:extLst>
+          </p:cNvPr>
+          <p:cNvSpPr>
+            <a:spLocks noGrp="1"/>
+          </p:cNvSpPr>
+          <p:nvPr>
+            <p:ph type="title"/>
+          </p:nvPr>
+        </p:nvSpPr>
+        <p:spPr>
+          <a:xfrm>
+            <a:off x="9007686" y="203706"/>
+            <a:ext cx="2772636" cy="1446550"/>
+          </a:xfrm>
+        </p:spPr>
+        <p:txBody>
+          <a:bodyPr>
+            <a:normAutofit/>
+          </a:bodyPr>
+          <a:lstStyle/>
+          <a:p>
+            <a:r>
+              <a:rPr lang="it-IT" sz="3600" dirty="0"/>
+              <a:t>VM Fault 3/4</a:t>
+            </a:r>
+            <a:br>
+              <a:rPr lang="it-IT" sz="4400" dirty="0"/>
+            </a:br>
+            <a:endParaRPr lang="it-IT" dirty="0"/>
+          </a:p>
+        </p:txBody>
+      </p:sp>
+      <p:cxnSp>
+        <p:nvCxnSpPr>
+          <p:cNvPr id="15" name="Connettore 1 14">
+            <a:extLst>
+              <a:ext uri="{FF2B5EF4-FFF2-40B4-BE49-F238E27FC236}">
+                <a16:creationId xmlns:a16="http://schemas.microsoft.com/office/drawing/2014/main" id="{C1F496B7-0E34-92F6-A787-9035D45D9534}"/>
+              </a:ext>
+            </a:extLst>
+          </p:cNvPr>
+          <p:cNvCxnSpPr>
+            <a:cxnSpLocks/>
+          </p:cNvCxnSpPr>
+          <p:nvPr/>
+        </p:nvCxnSpPr>
+        <p:spPr>
+          <a:xfrm>
+            <a:off x="2648197" y="914400"/>
+            <a:ext cx="9001497" cy="0"/>
+          </a:xfrm>
+          <a:prstGeom prst="line">
+            <a:avLst/>
+          </a:prstGeom>
+          <a:ln w="38100">
+            <a:solidFill>
+              <a:schemeClr val="tx1"/>
+            </a:solidFill>
+          </a:ln>
+        </p:spPr>
+        <p:style>
+          <a:lnRef idx="1">
+            <a:schemeClr val="accent1"/>
+          </a:lnRef>
+          <a:fillRef idx="0">
+            <a:schemeClr val="accent1"/>
+          </a:fillRef>
+          <a:effectRef idx="0">
+            <a:schemeClr val="accent1"/>
+          </a:effectRef>
+          <a:fontRef idx="minor">
+            <a:schemeClr val="tx1"/>
+          </a:fontRef>
+        </p:style>
+      </p:cxnSp>
+      <p:pic>
+        <p:nvPicPr>
+          <p:cNvPr id="20" name="Immagine 19">
+            <a:extLst>
+              <a:ext uri="{FF2B5EF4-FFF2-40B4-BE49-F238E27FC236}">
+                <a16:creationId xmlns:a16="http://schemas.microsoft.com/office/drawing/2014/main" id="{F914F839-013B-DAE5-4A35-15CE4EC1BA01}"/>
+              </a:ext>
+            </a:extLst>
+          </p:cNvPr>
+          <p:cNvPicPr>
+            <a:picLocks noChangeAspect="1"/>
+          </p:cNvPicPr>
+          <p:nvPr/>
+        </p:nvPicPr>
+        <p:blipFill>
+          <a:blip r:embed="rId2"/>
+          <a:stretch>
+            <a:fillRect/>
+          </a:stretch>
+        </p:blipFill>
+        <p:spPr>
+          <a:xfrm>
+            <a:off x="355429" y="203706"/>
+            <a:ext cx="2292768" cy="1083333"/>
+          </a:xfrm>
+          <a:prstGeom prst="rect">
+            <a:avLst/>
+          </a:prstGeom>
+        </p:spPr>
+      </p:pic>
+      <p:pic>
+        <p:nvPicPr>
+          <p:cNvPr id="4" name="Immagine 3">
+            <a:extLst>
+              <a:ext uri="{FF2B5EF4-FFF2-40B4-BE49-F238E27FC236}">
+                <a16:creationId xmlns:a16="http://schemas.microsoft.com/office/drawing/2014/main" id="{E73C62F4-9A61-E1AA-B7CD-F71B3DAE018C}"/>
+              </a:ext>
+            </a:extLst>
+          </p:cNvPr>
+          <p:cNvPicPr>
+            <a:picLocks noChangeAspect="1"/>
+          </p:cNvPicPr>
+          <p:nvPr/>
+        </p:nvPicPr>
+        <p:blipFill>
+          <a:blip r:embed="rId3"/>
+          <a:stretch>
+            <a:fillRect/>
+          </a:stretch>
+        </p:blipFill>
+        <p:spPr>
+          <a:xfrm>
+            <a:off x="1595251" y="1625095"/>
+            <a:ext cx="9413175" cy="4881491"/>
+          </a:xfrm>
+          <a:prstGeom prst="rect">
+            <a:avLst/>
+          </a:prstGeom>
+        </p:spPr>
+      </p:pic>
+      <p:pic>
+        <p:nvPicPr>
+          <p:cNvPr id="5" name="Immagine 4">
+            <a:extLst>
+              <a:ext uri="{FF2B5EF4-FFF2-40B4-BE49-F238E27FC236}">
+                <a16:creationId xmlns:a16="http://schemas.microsoft.com/office/drawing/2014/main" id="{55AE0250-58A9-67F7-4E02-377FFF686368}"/>
+              </a:ext>
+            </a:extLst>
+          </p:cNvPr>
+          <p:cNvPicPr>
+            <a:picLocks noChangeAspect="1"/>
+          </p:cNvPicPr>
+          <p:nvPr/>
+        </p:nvPicPr>
+        <p:blipFill>
+          <a:blip r:embed="rId4"/>
+          <a:stretch>
+            <a:fillRect/>
+          </a:stretch>
+        </p:blipFill>
+        <p:spPr>
+          <a:xfrm>
+            <a:off x="1894006" y="5549023"/>
+            <a:ext cx="1845481" cy="789153"/>
+          </a:xfrm>
+          <a:prstGeom prst="rect">
+            <a:avLst/>
+          </a:prstGeom>
+        </p:spPr>
+      </p:pic>
+    </p:spTree>
+    <p:extLst>
+      <p:ext uri="{BB962C8B-B14F-4D97-AF65-F5344CB8AC3E}">
+        <p14:creationId xmlns:p14="http://schemas.microsoft.com/office/powerpoint/2010/main" val="189418669"/>
+      </p:ext>
+    </p:extLst>
+  </p:cSld>
+  <p:clrMapOvr>
+    <a:masterClrMapping/>
+  </p:clrMapOvr>
+</p:sld>
+</file>
+
+<file path=ppt/slides/slide47.xml><?xml version="1.0" encoding="utf-8"?>
+<p:sld xmlns:a="http://schemas.openxmlformats.org/drawingml/2006/main" xmlns:r="http://schemas.openxmlformats.org/officeDocument/2006/relationships" xmlns:p="http://schemas.openxmlformats.org/presentationml/2006/main" showMasterSp="0">
+  <p:cSld>
+    <p:spTree>
+      <p:nvGrpSpPr>
+        <p:cNvPr id="1" name=""/>
+        <p:cNvGrpSpPr/>
+        <p:nvPr/>
+      </p:nvGrpSpPr>
+      <p:grpSpPr>
+        <a:xfrm>
+          <a:off x="0" y="0"/>
+          <a:ext cx="0" cy="0"/>
+          <a:chOff x="0" y="0"/>
+          <a:chExt cx="0" cy="0"/>
+        </a:xfrm>
+      </p:grpSpPr>
+      <p:sp>
+        <p:nvSpPr>
+          <p:cNvPr id="11" name="Titolo 10">
+            <a:extLst>
+              <a:ext uri="{FF2B5EF4-FFF2-40B4-BE49-F238E27FC236}">
+                <a16:creationId xmlns:a16="http://schemas.microsoft.com/office/drawing/2014/main" id="{467E9D4C-B62B-01CF-847C-A9EC44C81FD4}"/>
+              </a:ext>
+            </a:extLst>
+          </p:cNvPr>
+          <p:cNvSpPr>
+            <a:spLocks noGrp="1"/>
+          </p:cNvSpPr>
+          <p:nvPr>
+            <p:ph type="title"/>
+          </p:nvPr>
+        </p:nvSpPr>
+        <p:spPr>
+          <a:xfrm>
+            <a:off x="8120418" y="203706"/>
+            <a:ext cx="3659904" cy="1446550"/>
+          </a:xfrm>
+        </p:spPr>
+        <p:txBody>
+          <a:bodyPr>
+            <a:normAutofit fontScale="90000"/>
+          </a:bodyPr>
+          <a:lstStyle/>
+          <a:p>
+            <a:r>
+              <a:rPr lang="it-IT" sz="3600" dirty="0" err="1"/>
+              <a:t>Clean</a:t>
+            </a:r>
+            <a:r>
+              <a:rPr lang="it-IT" sz="3600" dirty="0"/>
+              <a:t> Memory frame</a:t>
+            </a:r>
+            <a:br>
+              <a:rPr lang="it-IT" sz="4400" dirty="0"/>
+            </a:br>
+            <a:endParaRPr lang="it-IT" dirty="0"/>
+          </a:p>
+        </p:txBody>
+      </p:sp>
+      <p:cxnSp>
+        <p:nvCxnSpPr>
+          <p:cNvPr id="15" name="Connettore 1 14">
+            <a:extLst>
+              <a:ext uri="{FF2B5EF4-FFF2-40B4-BE49-F238E27FC236}">
+                <a16:creationId xmlns:a16="http://schemas.microsoft.com/office/drawing/2014/main" id="{C1F496B7-0E34-92F6-A787-9035D45D9534}"/>
+              </a:ext>
+            </a:extLst>
+          </p:cNvPr>
+          <p:cNvCxnSpPr>
+            <a:cxnSpLocks/>
+          </p:cNvCxnSpPr>
+          <p:nvPr/>
+        </p:nvCxnSpPr>
+        <p:spPr>
+          <a:xfrm>
+            <a:off x="2648197" y="914400"/>
+            <a:ext cx="9001497" cy="0"/>
+          </a:xfrm>
+          <a:prstGeom prst="line">
+            <a:avLst/>
+          </a:prstGeom>
+          <a:ln w="38100">
+            <a:solidFill>
+              <a:schemeClr val="tx1"/>
+            </a:solidFill>
+          </a:ln>
+        </p:spPr>
+        <p:style>
+          <a:lnRef idx="1">
+            <a:schemeClr val="accent1"/>
+          </a:lnRef>
+          <a:fillRef idx="0">
+            <a:schemeClr val="accent1"/>
+          </a:fillRef>
+          <a:effectRef idx="0">
+            <a:schemeClr val="accent1"/>
+          </a:effectRef>
+          <a:fontRef idx="minor">
+            <a:schemeClr val="tx1"/>
+          </a:fontRef>
+        </p:style>
+      </p:cxnSp>
+      <p:pic>
+        <p:nvPicPr>
+          <p:cNvPr id="20" name="Immagine 19">
+            <a:extLst>
+              <a:ext uri="{FF2B5EF4-FFF2-40B4-BE49-F238E27FC236}">
+                <a16:creationId xmlns:a16="http://schemas.microsoft.com/office/drawing/2014/main" id="{F914F839-013B-DAE5-4A35-15CE4EC1BA01}"/>
+              </a:ext>
+            </a:extLst>
+          </p:cNvPr>
+          <p:cNvPicPr>
+            <a:picLocks noChangeAspect="1"/>
+          </p:cNvPicPr>
+          <p:nvPr/>
+        </p:nvPicPr>
+        <p:blipFill>
+          <a:blip r:embed="rId2"/>
+          <a:stretch>
+            <a:fillRect/>
+          </a:stretch>
+        </p:blipFill>
+        <p:spPr>
+          <a:xfrm>
+            <a:off x="355429" y="203706"/>
+            <a:ext cx="2292768" cy="1083333"/>
+          </a:xfrm>
+          <a:prstGeom prst="rect">
+            <a:avLst/>
+          </a:prstGeom>
+        </p:spPr>
+      </p:pic>
+    </p:spTree>
+    <p:extLst>
+      <p:ext uri="{BB962C8B-B14F-4D97-AF65-F5344CB8AC3E}">
+        <p14:creationId xmlns:p14="http://schemas.microsoft.com/office/powerpoint/2010/main" val="3163142864"/>
+      </p:ext>
+    </p:extLst>
+  </p:cSld>
+  <p:clrMapOvr>
+    <a:masterClrMapping/>
+  </p:clrMapOvr>
+</p:sld>
+</file>
+
+<file path=ppt/slides/slide48.xml><?xml version="1.0" encoding="utf-8"?>
+<p:sld xmlns:a="http://schemas.openxmlformats.org/drawingml/2006/main" xmlns:r="http://schemas.openxmlformats.org/officeDocument/2006/relationships" xmlns:p="http://schemas.openxmlformats.org/presentationml/2006/main" showMasterSp="0">
+  <p:cSld>
+    <p:spTree>
+      <p:nvGrpSpPr>
+        <p:cNvPr id="1" name=""/>
+        <p:cNvGrpSpPr/>
+        <p:nvPr/>
+      </p:nvGrpSpPr>
+      <p:grpSpPr>
+        <a:xfrm>
+          <a:off x="0" y="0"/>
+          <a:ext cx="0" cy="0"/>
+          <a:chOff x="0" y="0"/>
+          <a:chExt cx="0" cy="0"/>
+        </a:xfrm>
+      </p:grpSpPr>
+      <p:sp>
+        <p:nvSpPr>
+          <p:cNvPr id="11" name="Titolo 10">
+            <a:extLst>
+              <a:ext uri="{FF2B5EF4-FFF2-40B4-BE49-F238E27FC236}">
+                <a16:creationId xmlns:a16="http://schemas.microsoft.com/office/drawing/2014/main" id="{467E9D4C-B62B-01CF-847C-A9EC44C81FD4}"/>
+              </a:ext>
+            </a:extLst>
+          </p:cNvPr>
+          <p:cNvSpPr>
+            <a:spLocks noGrp="1"/>
+          </p:cNvSpPr>
+          <p:nvPr>
+            <p:ph type="title"/>
+          </p:nvPr>
+        </p:nvSpPr>
+        <p:spPr>
+          <a:xfrm>
+            <a:off x="9007686" y="203706"/>
+            <a:ext cx="2772636" cy="1446550"/>
+          </a:xfrm>
+        </p:spPr>
+        <p:txBody>
+          <a:bodyPr>
+            <a:normAutofit/>
+          </a:bodyPr>
+          <a:lstStyle/>
+          <a:p>
+            <a:r>
+              <a:rPr lang="it-IT" sz="3600" dirty="0"/>
+              <a:t>VM Fault 4/4</a:t>
+            </a:r>
+            <a:br>
+              <a:rPr lang="it-IT" sz="4400" dirty="0"/>
+            </a:br>
+            <a:endParaRPr lang="it-IT" dirty="0"/>
+          </a:p>
+        </p:txBody>
+      </p:sp>
+      <p:cxnSp>
+        <p:nvCxnSpPr>
+          <p:cNvPr id="15" name="Connettore 1 14">
+            <a:extLst>
+              <a:ext uri="{FF2B5EF4-FFF2-40B4-BE49-F238E27FC236}">
+                <a16:creationId xmlns:a16="http://schemas.microsoft.com/office/drawing/2014/main" id="{C1F496B7-0E34-92F6-A787-9035D45D9534}"/>
+              </a:ext>
+            </a:extLst>
+          </p:cNvPr>
+          <p:cNvCxnSpPr>
+            <a:cxnSpLocks/>
+          </p:cNvCxnSpPr>
+          <p:nvPr/>
+        </p:nvCxnSpPr>
+        <p:spPr>
+          <a:xfrm>
+            <a:off x="2648197" y="914400"/>
+            <a:ext cx="9001497" cy="0"/>
+          </a:xfrm>
+          <a:prstGeom prst="line">
+            <a:avLst/>
+          </a:prstGeom>
+          <a:ln w="38100">
+            <a:solidFill>
+              <a:schemeClr val="tx1"/>
+            </a:solidFill>
+          </a:ln>
+        </p:spPr>
+        <p:style>
+          <a:lnRef idx="1">
+            <a:schemeClr val="accent1"/>
+          </a:lnRef>
+          <a:fillRef idx="0">
+            <a:schemeClr val="accent1"/>
+          </a:fillRef>
+          <a:effectRef idx="0">
+            <a:schemeClr val="accent1"/>
+          </a:effectRef>
+          <a:fontRef idx="minor">
+            <a:schemeClr val="tx1"/>
+          </a:fontRef>
+        </p:style>
+      </p:cxnSp>
+      <p:pic>
+        <p:nvPicPr>
+          <p:cNvPr id="20" name="Immagine 19">
+            <a:extLst>
+              <a:ext uri="{FF2B5EF4-FFF2-40B4-BE49-F238E27FC236}">
+                <a16:creationId xmlns:a16="http://schemas.microsoft.com/office/drawing/2014/main" id="{F914F839-013B-DAE5-4A35-15CE4EC1BA01}"/>
+              </a:ext>
+            </a:extLst>
+          </p:cNvPr>
+          <p:cNvPicPr>
+            <a:picLocks noChangeAspect="1"/>
+          </p:cNvPicPr>
+          <p:nvPr/>
+        </p:nvPicPr>
+        <p:blipFill>
+          <a:blip r:embed="rId2"/>
+          <a:stretch>
+            <a:fillRect/>
+          </a:stretch>
+        </p:blipFill>
+        <p:spPr>
+          <a:xfrm>
+            <a:off x="355429" y="203706"/>
+            <a:ext cx="2292768" cy="1083333"/>
+          </a:xfrm>
+          <a:prstGeom prst="rect">
+            <a:avLst/>
+          </a:prstGeom>
+        </p:spPr>
+      </p:pic>
+      <p:pic>
+        <p:nvPicPr>
+          <p:cNvPr id="3" name="Immagine 2">
+            <a:extLst>
+              <a:ext uri="{FF2B5EF4-FFF2-40B4-BE49-F238E27FC236}">
+                <a16:creationId xmlns:a16="http://schemas.microsoft.com/office/drawing/2014/main" id="{059075DD-F2AB-26EA-5048-B1F195E2AD68}"/>
+              </a:ext>
+            </a:extLst>
+          </p:cNvPr>
+          <p:cNvPicPr>
+            <a:picLocks noChangeAspect="1"/>
+          </p:cNvPicPr>
+          <p:nvPr/>
+        </p:nvPicPr>
+        <p:blipFill>
+          <a:blip r:embed="rId3"/>
+          <a:stretch>
+            <a:fillRect/>
+          </a:stretch>
+        </p:blipFill>
+        <p:spPr>
+          <a:xfrm>
+            <a:off x="1584941" y="2028733"/>
+            <a:ext cx="9800218" cy="4170184"/>
+          </a:xfrm>
+          <a:prstGeom prst="rect">
+            <a:avLst/>
+          </a:prstGeom>
+        </p:spPr>
+      </p:pic>
+      <p:pic>
+        <p:nvPicPr>
+          <p:cNvPr id="4" name="Immagine 3">
+            <a:extLst>
+              <a:ext uri="{FF2B5EF4-FFF2-40B4-BE49-F238E27FC236}">
+                <a16:creationId xmlns:a16="http://schemas.microsoft.com/office/drawing/2014/main" id="{10C679AB-32F7-479A-9391-B4CA94B85483}"/>
+              </a:ext>
+            </a:extLst>
+          </p:cNvPr>
+          <p:cNvPicPr>
+            <a:picLocks noChangeAspect="1"/>
+          </p:cNvPicPr>
+          <p:nvPr/>
+        </p:nvPicPr>
+        <p:blipFill>
+          <a:blip r:embed="rId4"/>
+          <a:stretch>
+            <a:fillRect/>
+          </a:stretch>
+        </p:blipFill>
+        <p:spPr>
+          <a:xfrm>
+            <a:off x="2472709" y="3713775"/>
+            <a:ext cx="1651000" cy="800100"/>
+          </a:xfrm>
+          <a:prstGeom prst="rect">
+            <a:avLst/>
+          </a:prstGeom>
+        </p:spPr>
+      </p:pic>
+    </p:spTree>
+    <p:extLst>
+      <p:ext uri="{BB962C8B-B14F-4D97-AF65-F5344CB8AC3E}">
+        <p14:creationId xmlns:p14="http://schemas.microsoft.com/office/powerpoint/2010/main" val="4185866789"/>
+      </p:ext>
+    </p:extLst>
+  </p:cSld>
+  <p:clrMapOvr>
+    <a:masterClrMapping/>
+  </p:clrMapOvr>
+</p:sld>
+</file>
+
+<file path=ppt/slides/slide49.xml><?xml version="1.0" encoding="utf-8"?>
+<p:sld xmlns:a="http://schemas.openxmlformats.org/drawingml/2006/main" xmlns:r="http://schemas.openxmlformats.org/officeDocument/2006/relationships" xmlns:p="http://schemas.openxmlformats.org/presentationml/2006/main" showMasterSp="0">
+  <p:cSld>
+    <p:spTree>
+      <p:nvGrpSpPr>
+        <p:cNvPr id="1" name=""/>
+        <p:cNvGrpSpPr/>
+        <p:nvPr/>
+      </p:nvGrpSpPr>
+      <p:grpSpPr>
+        <a:xfrm>
+          <a:off x="0" y="0"/>
+          <a:ext cx="0" cy="0"/>
+          <a:chOff x="0" y="0"/>
+          <a:chExt cx="0" cy="0"/>
+        </a:xfrm>
+      </p:grpSpPr>
+      <p:sp>
+        <p:nvSpPr>
+          <p:cNvPr id="11" name="Titolo 10">
+            <a:extLst>
+              <a:ext uri="{FF2B5EF4-FFF2-40B4-BE49-F238E27FC236}">
+                <a16:creationId xmlns:a16="http://schemas.microsoft.com/office/drawing/2014/main" id="{467E9D4C-B62B-01CF-847C-A9EC44C81FD4}"/>
+              </a:ext>
+            </a:extLst>
+          </p:cNvPr>
+          <p:cNvSpPr>
+            <a:spLocks noGrp="1"/>
+          </p:cNvSpPr>
+          <p:nvPr>
+            <p:ph type="title"/>
+          </p:nvPr>
+        </p:nvSpPr>
+        <p:spPr>
+          <a:xfrm>
+            <a:off x="9007686" y="203706"/>
+            <a:ext cx="2772636" cy="1446550"/>
+          </a:xfrm>
+        </p:spPr>
+        <p:txBody>
+          <a:bodyPr>
+            <a:normAutofit/>
+          </a:bodyPr>
+          <a:lstStyle/>
+          <a:p>
+            <a:r>
+              <a:rPr lang="it-IT" sz="3600" dirty="0"/>
+              <a:t>Swap In</a:t>
+            </a:r>
+            <a:br>
+              <a:rPr lang="it-IT" sz="4400" dirty="0"/>
+            </a:br>
+            <a:endParaRPr lang="it-IT" dirty="0"/>
+          </a:p>
+        </p:txBody>
+      </p:sp>
+      <p:cxnSp>
+        <p:nvCxnSpPr>
+          <p:cNvPr id="15" name="Connettore 1 14">
+            <a:extLst>
+              <a:ext uri="{FF2B5EF4-FFF2-40B4-BE49-F238E27FC236}">
+                <a16:creationId xmlns:a16="http://schemas.microsoft.com/office/drawing/2014/main" id="{C1F496B7-0E34-92F6-A787-9035D45D9534}"/>
+              </a:ext>
+            </a:extLst>
+          </p:cNvPr>
+          <p:cNvCxnSpPr>
+            <a:cxnSpLocks/>
+          </p:cNvCxnSpPr>
+          <p:nvPr/>
+        </p:nvCxnSpPr>
+        <p:spPr>
+          <a:xfrm>
+            <a:off x="2648197" y="914400"/>
+            <a:ext cx="9001497" cy="0"/>
+          </a:xfrm>
+          <a:prstGeom prst="line">
+            <a:avLst/>
+          </a:prstGeom>
+          <a:ln w="38100">
+            <a:solidFill>
+              <a:schemeClr val="tx1"/>
+            </a:solidFill>
+          </a:ln>
+        </p:spPr>
+        <p:style>
+          <a:lnRef idx="1">
+            <a:schemeClr val="accent1"/>
+          </a:lnRef>
+          <a:fillRef idx="0">
+            <a:schemeClr val="accent1"/>
+          </a:fillRef>
+          <a:effectRef idx="0">
+            <a:schemeClr val="accent1"/>
+          </a:effectRef>
+          <a:fontRef idx="minor">
+            <a:schemeClr val="tx1"/>
+          </a:fontRef>
+        </p:style>
+      </p:cxnSp>
+      <p:pic>
+        <p:nvPicPr>
+          <p:cNvPr id="20" name="Immagine 19">
+            <a:extLst>
+              <a:ext uri="{FF2B5EF4-FFF2-40B4-BE49-F238E27FC236}">
+                <a16:creationId xmlns:a16="http://schemas.microsoft.com/office/drawing/2014/main" id="{F914F839-013B-DAE5-4A35-15CE4EC1BA01}"/>
+              </a:ext>
+            </a:extLst>
+          </p:cNvPr>
+          <p:cNvPicPr>
+            <a:picLocks noChangeAspect="1"/>
+          </p:cNvPicPr>
+          <p:nvPr/>
+        </p:nvPicPr>
+        <p:blipFill>
+          <a:blip r:embed="rId2"/>
+          <a:stretch>
+            <a:fillRect/>
+          </a:stretch>
+        </p:blipFill>
+        <p:spPr>
+          <a:xfrm>
+            <a:off x="355429" y="203706"/>
+            <a:ext cx="2292768" cy="1083333"/>
+          </a:xfrm>
+          <a:prstGeom prst="rect">
+            <a:avLst/>
+          </a:prstGeom>
+        </p:spPr>
+      </p:pic>
+      <p:pic>
+        <p:nvPicPr>
           <p:cNvPr id="2" name="Immagine 1" descr="Immagine che contiene diagramma&#10;&#10;Descrizione generata automaticamente">
             <a:extLst>
               <a:ext uri="{FF2B5EF4-FFF2-40B4-BE49-F238E27FC236}">
@@ -16859,7 +18428,190 @@
 </p:sld>
 </file>
 
-<file path=ppt/slides/slide43.xml><?xml version="1.0" encoding="utf-8"?>
+<file path=ppt/slides/slide5.xml><?xml version="1.0" encoding="utf-8"?>
+<p:sld xmlns:a="http://schemas.openxmlformats.org/drawingml/2006/main" xmlns:r="http://schemas.openxmlformats.org/officeDocument/2006/relationships" xmlns:p="http://schemas.openxmlformats.org/presentationml/2006/main" showMasterSp="0">
+  <p:cSld>
+    <p:spTree>
+      <p:nvGrpSpPr>
+        <p:cNvPr id="1" name=""/>
+        <p:cNvGrpSpPr/>
+        <p:nvPr/>
+      </p:nvGrpSpPr>
+      <p:grpSpPr>
+        <a:xfrm>
+          <a:off x="0" y="0"/>
+          <a:ext cx="0" cy="0"/>
+          <a:chOff x="0" y="0"/>
+          <a:chExt cx="0" cy="0"/>
+        </a:xfrm>
+      </p:grpSpPr>
+      <p:sp>
+        <p:nvSpPr>
+          <p:cNvPr id="11" name="Titolo 10">
+            <a:extLst>
+              <a:ext uri="{FF2B5EF4-FFF2-40B4-BE49-F238E27FC236}">
+                <a16:creationId xmlns:a16="http://schemas.microsoft.com/office/drawing/2014/main" id="{467E9D4C-B62B-01CF-847C-A9EC44C81FD4}"/>
+              </a:ext>
+            </a:extLst>
+          </p:cNvPr>
+          <p:cNvSpPr>
+            <a:spLocks noGrp="1"/>
+          </p:cNvSpPr>
+          <p:nvPr>
+            <p:ph type="title"/>
+          </p:nvPr>
+        </p:nvSpPr>
+        <p:spPr>
+          <a:xfrm>
+            <a:off x="6096000" y="303813"/>
+            <a:ext cx="5740571" cy="1251468"/>
+          </a:xfrm>
+        </p:spPr>
+        <p:txBody>
+          <a:bodyPr>
+            <a:normAutofit fontScale="90000"/>
+          </a:bodyPr>
+          <a:lstStyle/>
+          <a:p>
+            <a:r>
+              <a:rPr lang="it-IT" sz="3200" dirty="0"/>
+              <a:t>Memory management - </a:t>
+            </a:r>
+            <a:r>
+              <a:rPr lang="it-IT" sz="3200" dirty="0" err="1"/>
+              <a:t>Initialization</a:t>
+            </a:r>
+            <a:br>
+              <a:rPr lang="it-IT" sz="4400" dirty="0"/>
+            </a:br>
+            <a:endParaRPr lang="it-IT" dirty="0"/>
+          </a:p>
+        </p:txBody>
+      </p:sp>
+      <p:cxnSp>
+        <p:nvCxnSpPr>
+          <p:cNvPr id="15" name="Connettore 1 14">
+            <a:extLst>
+              <a:ext uri="{FF2B5EF4-FFF2-40B4-BE49-F238E27FC236}">
+                <a16:creationId xmlns:a16="http://schemas.microsoft.com/office/drawing/2014/main" id="{C1F496B7-0E34-92F6-A787-9035D45D9534}"/>
+              </a:ext>
+            </a:extLst>
+          </p:cNvPr>
+          <p:cNvCxnSpPr>
+            <a:cxnSpLocks/>
+          </p:cNvCxnSpPr>
+          <p:nvPr/>
+        </p:nvCxnSpPr>
+        <p:spPr>
+          <a:xfrm>
+            <a:off x="2648197" y="914400"/>
+            <a:ext cx="9001497" cy="0"/>
+          </a:xfrm>
+          <a:prstGeom prst="line">
+            <a:avLst/>
+          </a:prstGeom>
+          <a:ln w="38100">
+            <a:solidFill>
+              <a:schemeClr val="tx1"/>
+            </a:solidFill>
+          </a:ln>
+        </p:spPr>
+        <p:style>
+          <a:lnRef idx="1">
+            <a:schemeClr val="accent1"/>
+          </a:lnRef>
+          <a:fillRef idx="0">
+            <a:schemeClr val="accent1"/>
+          </a:fillRef>
+          <a:effectRef idx="0">
+            <a:schemeClr val="accent1"/>
+          </a:effectRef>
+          <a:fontRef idx="minor">
+            <a:schemeClr val="tx1"/>
+          </a:fontRef>
+        </p:style>
+      </p:cxnSp>
+      <p:pic>
+        <p:nvPicPr>
+          <p:cNvPr id="20" name="Immagine 19">
+            <a:extLst>
+              <a:ext uri="{FF2B5EF4-FFF2-40B4-BE49-F238E27FC236}">
+                <a16:creationId xmlns:a16="http://schemas.microsoft.com/office/drawing/2014/main" id="{F914F839-013B-DAE5-4A35-15CE4EC1BA01}"/>
+              </a:ext>
+            </a:extLst>
+          </p:cNvPr>
+          <p:cNvPicPr>
+            <a:picLocks noChangeAspect="1"/>
+          </p:cNvPicPr>
+          <p:nvPr/>
+        </p:nvPicPr>
+        <p:blipFill>
+          <a:blip r:embed="rId2"/>
+          <a:stretch>
+            <a:fillRect/>
+          </a:stretch>
+        </p:blipFill>
+        <p:spPr>
+          <a:xfrm>
+            <a:off x="355429" y="203706"/>
+            <a:ext cx="2292768" cy="1083333"/>
+          </a:xfrm>
+          <a:prstGeom prst="rect">
+            <a:avLst/>
+          </a:prstGeom>
+        </p:spPr>
+      </p:pic>
+      <p:pic>
+        <p:nvPicPr>
+          <p:cNvPr id="10" name="Immagine 9">
+            <a:extLst>
+              <a:ext uri="{FF2B5EF4-FFF2-40B4-BE49-F238E27FC236}">
+                <a16:creationId xmlns:a16="http://schemas.microsoft.com/office/drawing/2014/main" id="{4B673071-5EC8-B101-CA6B-CC9D326B9C09}"/>
+              </a:ext>
+            </a:extLst>
+          </p:cNvPr>
+          <p:cNvPicPr>
+            <a:picLocks noChangeAspect="1"/>
+          </p:cNvPicPr>
+          <p:nvPr/>
+        </p:nvPicPr>
+        <p:blipFill>
+          <a:blip r:embed="rId3"/>
+          <a:stretch>
+            <a:fillRect/>
+          </a:stretch>
+        </p:blipFill>
+        <p:spPr>
+          <a:xfrm>
+            <a:off x="2907092" y="1524988"/>
+            <a:ext cx="6377816" cy="4746708"/>
+          </a:xfrm>
+          <a:prstGeom prst="rect">
+            <a:avLst/>
+          </a:prstGeom>
+          <a:ln w="19050">
+            <a:solidFill>
+              <a:schemeClr val="bg1">
+                <a:lumMod val="75000"/>
+              </a:schemeClr>
+            </a:solidFill>
+          </a:ln>
+        </p:spPr>
+      </p:pic>
+    </p:spTree>
+    <p:extLst>
+      <p:ext uri="{BB962C8B-B14F-4D97-AF65-F5344CB8AC3E}">
+        <p14:creationId xmlns:p14="http://schemas.microsoft.com/office/powerpoint/2010/main" val="3048406854"/>
+      </p:ext>
+    </p:extLst>
+  </p:cSld>
+  <p:clrMapOvr>
+    <a:masterClrMapping/>
+  </p:clrMapOvr>
+</p:sld>
+</file>
+
+<file path=ppt/slides/slide50.xml><?xml version="1.0" encoding="utf-8"?>
 <p:sld xmlns:a="http://schemas.openxmlformats.org/drawingml/2006/main" xmlns:r="http://schemas.openxmlformats.org/officeDocument/2006/relationships" xmlns:p="http://schemas.openxmlformats.org/presentationml/2006/main" showMasterSp="0">
   <p:cSld>
     <p:spTree>
@@ -17411,7 +19163,7 @@
 </p:sld>
 </file>
 
-<file path=ppt/slides/slide44.xml><?xml version="1.0" encoding="utf-8"?>
+<file path=ppt/slides/slide51.xml><?xml version="1.0" encoding="utf-8"?>
 <p:sld xmlns:a="http://schemas.openxmlformats.org/drawingml/2006/main" xmlns:r="http://schemas.openxmlformats.org/officeDocument/2006/relationships" xmlns:p="http://schemas.openxmlformats.org/presentationml/2006/main" showMasterSp="0">
   <p:cSld>
     <p:spTree>
@@ -18218,7 +19970,7 @@
 </p:sld>
 </file>
 
-<file path=ppt/slides/slide45.xml><?xml version="1.0" encoding="utf-8"?>
+<file path=ppt/slides/slide52.xml><?xml version="1.0" encoding="utf-8"?>
 <p:sld xmlns:a="http://schemas.openxmlformats.org/drawingml/2006/main" xmlns:r="http://schemas.openxmlformats.org/officeDocument/2006/relationships" xmlns:p="http://schemas.openxmlformats.org/presentationml/2006/main" showMasterSp="0">
   <p:cSld>
     <p:spTree>
@@ -19029,7 +20781,7 @@
 </p:sld>
 </file>
 
-<file path=ppt/slides/slide46.xml><?xml version="1.0" encoding="utf-8"?>
+<file path=ppt/slides/slide53.xml><?xml version="1.0" encoding="utf-8"?>
 <p:sld xmlns:a="http://schemas.openxmlformats.org/drawingml/2006/main" xmlns:r="http://schemas.openxmlformats.org/officeDocument/2006/relationships" xmlns:p="http://schemas.openxmlformats.org/presentationml/2006/main" showMasterSp="0">
   <p:cSld>
     <p:spTree>
@@ -19824,7 +21576,7 @@
 </p:sld>
 </file>
 
-<file path=ppt/slides/slide47.xml><?xml version="1.0" encoding="utf-8"?>
+<file path=ppt/slides/slide54.xml><?xml version="1.0" encoding="utf-8"?>
 <p:sld xmlns:a="http://schemas.openxmlformats.org/drawingml/2006/main" xmlns:r="http://schemas.openxmlformats.org/officeDocument/2006/relationships" xmlns:p="http://schemas.openxmlformats.org/presentationml/2006/main" showMasterSp="0">
   <p:cSld>
     <p:spTree>
@@ -20301,7 +22053,7 @@
                 <a:effectLst/>
                 <a:latin typeface="Consolas" panose="020B0609020204030204" pitchFamily="49" charset="0"/>
               </a:rPr>
-              <a:t>uint8_t</a:t>
+              <a:t>uint32_t</a:t>
             </a:r>
             <a:r>
               <a:rPr lang="fr-FR" b="0" dirty="0">
@@ -20341,7 +22093,7 @@
                 <a:effectLst/>
                 <a:latin typeface="Consolas" panose="020B0609020204030204" pitchFamily="49" charset="0"/>
               </a:rPr>
-              <a:t>uint8_t</a:t>
+              <a:t>uint32_t</a:t>
             </a:r>
             <a:r>
               <a:rPr lang="fr-FR" b="0" dirty="0">
@@ -20555,7 +22307,7 @@
                 <a:effectLst/>
                 <a:latin typeface="Consolas" panose="020B0609020204030204" pitchFamily="49" charset="0"/>
               </a:rPr>
-              <a:t>uint8_t</a:t>
+              <a:t>uint32_t</a:t>
             </a:r>
             <a:r>
               <a:rPr lang="it-IT" b="0" dirty="0">
@@ -20813,7 +22565,7 @@
                 <a:effectLst/>
                 <a:latin typeface="Consolas" panose="020B0609020204030204" pitchFamily="49" charset="0"/>
               </a:rPr>
-              <a:t>uint8_t</a:t>
+              <a:t>uint32_t</a:t>
             </a:r>
             <a:r>
               <a:rPr lang="it-IT" b="0" dirty="0">
@@ -20915,7 +22667,7 @@
               <a:t>nvalidentries</a:t>
             </a:r>
             <a:r>
-              <a:rPr lang="it-IT" b="0" dirty="0">
+              <a:rPr lang="it-IT" b="0">
                 <a:solidFill>
                   <a:srgbClr val="000000"/>
                 </a:solidFill>
@@ -20925,14 +22677,24 @@
               <a:t>,</a:t>
             </a:r>
             <a:r>
-              <a:rPr lang="it-IT" b="0" dirty="0">
+              <a:rPr lang="it-IT" b="0">
                 <a:solidFill>
                   <a:srgbClr val="2B91AF"/>
                 </a:solidFill>
                 <a:effectLst/>
                 <a:latin typeface="Consolas" panose="020B0609020204030204" pitchFamily="49" charset="0"/>
               </a:rPr>
-              <a:t>uint8_t</a:t>
+              <a:t>uint32_</a:t>
+            </a:r>
+            <a:r>
+              <a:rPr lang="it-IT" b="0" dirty="0">
+                <a:solidFill>
+                  <a:srgbClr val="2B91AF"/>
+                </a:solidFill>
+                <a:effectLst/>
+                <a:latin typeface="Consolas" panose="020B0609020204030204" pitchFamily="49" charset="0"/>
+              </a:rPr>
+              <a:t>t</a:t>
             </a:r>
             <a:r>
               <a:rPr lang="it-IT" b="0" dirty="0">
@@ -21249,7 +23011,7 @@
 </p:sld>
 </file>
 
-<file path=ppt/slides/slide48.xml><?xml version="1.0" encoding="utf-8"?>
+<file path=ppt/slides/slide55.xml><?xml version="1.0" encoding="utf-8"?>
 <p:sld xmlns:a="http://schemas.openxmlformats.org/drawingml/2006/main" xmlns:r="http://schemas.openxmlformats.org/officeDocument/2006/relationships" xmlns:p="http://schemas.openxmlformats.org/presentationml/2006/main" showMasterSp="0">
   <p:cSld>
     <p:spTree>
@@ -21673,7 +23435,7 @@
                 <a:effectLst/>
                 <a:latin typeface="Consolas" panose="020B0609020204030204" pitchFamily="49" charset="0"/>
               </a:rPr>
-              <a:t>uint8_t</a:t>
+              <a:t>uint32_t</a:t>
             </a:r>
             <a:r>
               <a:rPr lang="fr-FR" b="0" dirty="0">
@@ -21713,7 +23475,7 @@
                 <a:effectLst/>
                 <a:latin typeface="Consolas" panose="020B0609020204030204" pitchFamily="49" charset="0"/>
               </a:rPr>
-              <a:t>uint8_t</a:t>
+              <a:t>uint32_t</a:t>
             </a:r>
             <a:r>
               <a:rPr lang="fr-FR" b="0" dirty="0">
@@ -21843,7 +23605,7 @@
                 <a:effectLst/>
                 <a:latin typeface="Consolas" panose="020B0609020204030204" pitchFamily="49" charset="0"/>
               </a:rPr>
-              <a:t>uint8_t</a:t>
+              <a:t>uint32_t</a:t>
             </a:r>
             <a:r>
               <a:rPr lang="it-IT" b="0" dirty="0">
@@ -21962,7 +23724,7 @@
                 <a:effectLst/>
                 <a:latin typeface="Consolas" panose="020B0609020204030204" pitchFamily="49" charset="0"/>
               </a:rPr>
-              <a:t>uint8_t</a:t>
+              <a:t>uint32_t</a:t>
             </a:r>
             <a:r>
               <a:rPr lang="it-IT" b="0" dirty="0">
@@ -22124,7 +23886,7 @@
 </p:sld>
 </file>
 
-<file path=ppt/slides/slide49.xml><?xml version="1.0" encoding="utf-8"?>
+<file path=ppt/slides/slide56.xml><?xml version="1.0" encoding="utf-8"?>
 <p:sld xmlns:a="http://schemas.openxmlformats.org/drawingml/2006/main" xmlns:r="http://schemas.openxmlformats.org/officeDocument/2006/relationships" xmlns:p="http://schemas.openxmlformats.org/presentationml/2006/main" showMasterSp="0">
   <p:cSld>
     <p:spTree>
@@ -22658,190 +24420,7 @@
 </p:sld>
 </file>
 
-<file path=ppt/slides/slide5.xml><?xml version="1.0" encoding="utf-8"?>
-<p:sld xmlns:a="http://schemas.openxmlformats.org/drawingml/2006/main" xmlns:r="http://schemas.openxmlformats.org/officeDocument/2006/relationships" xmlns:p="http://schemas.openxmlformats.org/presentationml/2006/main" showMasterSp="0">
-  <p:cSld>
-    <p:spTree>
-      <p:nvGrpSpPr>
-        <p:cNvPr id="1" name=""/>
-        <p:cNvGrpSpPr/>
-        <p:nvPr/>
-      </p:nvGrpSpPr>
-      <p:grpSpPr>
-        <a:xfrm>
-          <a:off x="0" y="0"/>
-          <a:ext cx="0" cy="0"/>
-          <a:chOff x="0" y="0"/>
-          <a:chExt cx="0" cy="0"/>
-        </a:xfrm>
-      </p:grpSpPr>
-      <p:sp>
-        <p:nvSpPr>
-          <p:cNvPr id="11" name="Titolo 10">
-            <a:extLst>
-              <a:ext uri="{FF2B5EF4-FFF2-40B4-BE49-F238E27FC236}">
-                <a16:creationId xmlns:a16="http://schemas.microsoft.com/office/drawing/2014/main" id="{467E9D4C-B62B-01CF-847C-A9EC44C81FD4}"/>
-              </a:ext>
-            </a:extLst>
-          </p:cNvPr>
-          <p:cNvSpPr>
-            <a:spLocks noGrp="1"/>
-          </p:cNvSpPr>
-          <p:nvPr>
-            <p:ph type="title"/>
-          </p:nvPr>
-        </p:nvSpPr>
-        <p:spPr>
-          <a:xfrm>
-            <a:off x="6096000" y="303813"/>
-            <a:ext cx="5740571" cy="1251468"/>
-          </a:xfrm>
-        </p:spPr>
-        <p:txBody>
-          <a:bodyPr>
-            <a:normAutofit fontScale="90000"/>
-          </a:bodyPr>
-          <a:lstStyle/>
-          <a:p>
-            <a:r>
-              <a:rPr lang="it-IT" sz="3200" dirty="0"/>
-              <a:t>Memory management - </a:t>
-            </a:r>
-            <a:r>
-              <a:rPr lang="it-IT" sz="3200" dirty="0" err="1"/>
-              <a:t>Initialization</a:t>
-            </a:r>
-            <a:br>
-              <a:rPr lang="it-IT" sz="4400" dirty="0"/>
-            </a:br>
-            <a:endParaRPr lang="it-IT" dirty="0"/>
-          </a:p>
-        </p:txBody>
-      </p:sp>
-      <p:cxnSp>
-        <p:nvCxnSpPr>
-          <p:cNvPr id="15" name="Connettore 1 14">
-            <a:extLst>
-              <a:ext uri="{FF2B5EF4-FFF2-40B4-BE49-F238E27FC236}">
-                <a16:creationId xmlns:a16="http://schemas.microsoft.com/office/drawing/2014/main" id="{C1F496B7-0E34-92F6-A787-9035D45D9534}"/>
-              </a:ext>
-            </a:extLst>
-          </p:cNvPr>
-          <p:cNvCxnSpPr>
-            <a:cxnSpLocks/>
-          </p:cNvCxnSpPr>
-          <p:nvPr/>
-        </p:nvCxnSpPr>
-        <p:spPr>
-          <a:xfrm>
-            <a:off x="2648197" y="914400"/>
-            <a:ext cx="9001497" cy="0"/>
-          </a:xfrm>
-          <a:prstGeom prst="line">
-            <a:avLst/>
-          </a:prstGeom>
-          <a:ln w="38100">
-            <a:solidFill>
-              <a:schemeClr val="tx1"/>
-            </a:solidFill>
-          </a:ln>
-        </p:spPr>
-        <p:style>
-          <a:lnRef idx="1">
-            <a:schemeClr val="accent1"/>
-          </a:lnRef>
-          <a:fillRef idx="0">
-            <a:schemeClr val="accent1"/>
-          </a:fillRef>
-          <a:effectRef idx="0">
-            <a:schemeClr val="accent1"/>
-          </a:effectRef>
-          <a:fontRef idx="minor">
-            <a:schemeClr val="tx1"/>
-          </a:fontRef>
-        </p:style>
-      </p:cxnSp>
-      <p:pic>
-        <p:nvPicPr>
-          <p:cNvPr id="20" name="Immagine 19">
-            <a:extLst>
-              <a:ext uri="{FF2B5EF4-FFF2-40B4-BE49-F238E27FC236}">
-                <a16:creationId xmlns:a16="http://schemas.microsoft.com/office/drawing/2014/main" id="{F914F839-013B-DAE5-4A35-15CE4EC1BA01}"/>
-              </a:ext>
-            </a:extLst>
-          </p:cNvPr>
-          <p:cNvPicPr>
-            <a:picLocks noChangeAspect="1"/>
-          </p:cNvPicPr>
-          <p:nvPr/>
-        </p:nvPicPr>
-        <p:blipFill>
-          <a:blip r:embed="rId2"/>
-          <a:stretch>
-            <a:fillRect/>
-          </a:stretch>
-        </p:blipFill>
-        <p:spPr>
-          <a:xfrm>
-            <a:off x="355429" y="203706"/>
-            <a:ext cx="2292768" cy="1083333"/>
-          </a:xfrm>
-          <a:prstGeom prst="rect">
-            <a:avLst/>
-          </a:prstGeom>
-        </p:spPr>
-      </p:pic>
-      <p:pic>
-        <p:nvPicPr>
-          <p:cNvPr id="10" name="Immagine 9">
-            <a:extLst>
-              <a:ext uri="{FF2B5EF4-FFF2-40B4-BE49-F238E27FC236}">
-                <a16:creationId xmlns:a16="http://schemas.microsoft.com/office/drawing/2014/main" id="{4B673071-5EC8-B101-CA6B-CC9D326B9C09}"/>
-              </a:ext>
-            </a:extLst>
-          </p:cNvPr>
-          <p:cNvPicPr>
-            <a:picLocks noChangeAspect="1"/>
-          </p:cNvPicPr>
-          <p:nvPr/>
-        </p:nvPicPr>
-        <p:blipFill>
-          <a:blip r:embed="rId3"/>
-          <a:stretch>
-            <a:fillRect/>
-          </a:stretch>
-        </p:blipFill>
-        <p:spPr>
-          <a:xfrm>
-            <a:off x="2907092" y="1524988"/>
-            <a:ext cx="6377816" cy="4746708"/>
-          </a:xfrm>
-          <a:prstGeom prst="rect">
-            <a:avLst/>
-          </a:prstGeom>
-          <a:ln w="19050">
-            <a:solidFill>
-              <a:schemeClr val="bg1">
-                <a:lumMod val="75000"/>
-              </a:schemeClr>
-            </a:solidFill>
-          </a:ln>
-        </p:spPr>
-      </p:pic>
-    </p:spTree>
-    <p:extLst>
-      <p:ext uri="{BB962C8B-B14F-4D97-AF65-F5344CB8AC3E}">
-        <p14:creationId xmlns:p14="http://schemas.microsoft.com/office/powerpoint/2010/main" val="3048406854"/>
-      </p:ext>
-    </p:extLst>
-  </p:cSld>
-  <p:clrMapOvr>
-    <a:masterClrMapping/>
-  </p:clrMapOvr>
-</p:sld>
-</file>
-
-<file path=ppt/slides/slide50.xml><?xml version="1.0" encoding="utf-8"?>
+<file path=ppt/slides/slide57.xml><?xml version="1.0" encoding="utf-8"?>
 <p:sld xmlns:a="http://schemas.openxmlformats.org/drawingml/2006/main" xmlns:r="http://schemas.openxmlformats.org/officeDocument/2006/relationships" xmlns:p="http://schemas.openxmlformats.org/presentationml/2006/main" showMasterSp="0">
   <p:cSld>
     <p:spTree>
@@ -25018,7 +26597,7 @@
         </p:blipFill>
         <p:spPr>
           <a:xfrm>
-            <a:off x="355429" y="1437294"/>
+            <a:off x="355429" y="1459596"/>
             <a:ext cx="11294265" cy="3034927"/>
           </a:xfrm>
           <a:prstGeom prst="rect">

</xml_diff>

<commit_message>
Update Flow Chart and Power point
</commit_message>
<xml_diff>
--- a/Presentazione Progetto OS161.pptx
+++ b/Presentazione Progetto OS161.pptx
@@ -708,7 +708,7 @@
           <a:p>
             <a:fld id="{3E8D6972-3784-6B4C-B9F3-068AC136E076}" type="datetimeFigureOut">
               <a:rPr lang="it-IT" smtClean="0"/>
-              <a:t>04/04/2023</a:t>
+              <a:t>05/04/2023</a:t>
             </a:fld>
             <a:endParaRPr lang="it-IT"/>
           </a:p>
@@ -1962,7 +1962,7 @@
             <a:fld id="{73C3BD54-29B9-3D42-B178-776ED395AA85}" type="datetimeFigureOut">
               <a:rPr lang="en-US" smtClean="0"/>
               <a:pPr/>
-              <a:t>4/4/2023</a:t>
+              <a:t>4/5/2023</a:t>
             </a:fld>
             <a:endParaRPr lang="en-US" sz="1400"/>
           </a:p>
@@ -2212,7 +2212,7 @@
           <a:p>
             <a:fld id="{73C3BD54-29B9-3D42-B178-776ED395AA85}" type="datetimeFigureOut">
               <a:rPr lang="en-US" smtClean="0"/>
-              <a:t>4/4/2023</a:t>
+              <a:t>4/5/2023</a:t>
             </a:fld>
             <a:endParaRPr lang="en-US"/>
           </a:p>
@@ -2526,7 +2526,7 @@
           <a:p>
             <a:fld id="{73C3BD54-29B9-3D42-B178-776ED395AA85}" type="datetimeFigureOut">
               <a:rPr lang="en-US" smtClean="0"/>
-              <a:t>4/4/2023</a:t>
+              <a:t>4/5/2023</a:t>
             </a:fld>
             <a:endParaRPr lang="en-US"/>
           </a:p>
@@ -3040,7 +3040,7 @@
           <a:p>
             <a:fld id="{73C3BD54-29B9-3D42-B178-776ED395AA85}" type="datetimeFigureOut">
               <a:rPr lang="en-US" smtClean="0"/>
-              <a:t>4/4/2023</a:t>
+              <a:t>4/5/2023</a:t>
             </a:fld>
             <a:endParaRPr lang="en-US"/>
           </a:p>
@@ -3471,7 +3471,7 @@
           <a:p>
             <a:fld id="{73C3BD54-29B9-3D42-B178-776ED395AA85}" type="datetimeFigureOut">
               <a:rPr lang="en-US" smtClean="0"/>
-              <a:t>4/4/2023</a:t>
+              <a:t>4/5/2023</a:t>
             </a:fld>
             <a:endParaRPr lang="en-US"/>
           </a:p>
@@ -3736,7 +3736,7 @@
           <a:p>
             <a:fld id="{73C3BD54-29B9-3D42-B178-776ED395AA85}" type="datetimeFigureOut">
               <a:rPr lang="en-US" smtClean="0"/>
-              <a:t>4/4/2023</a:t>
+              <a:t>4/5/2023</a:t>
             </a:fld>
             <a:endParaRPr lang="en-US"/>
           </a:p>
@@ -4310,7 +4310,7 @@
           <a:p>
             <a:fld id="{73C3BD54-29B9-3D42-B178-776ED395AA85}" type="datetimeFigureOut">
               <a:rPr lang="en-US" smtClean="0"/>
-              <a:t>4/4/2023</a:t>
+              <a:t>4/5/2023</a:t>
             </a:fld>
             <a:endParaRPr lang="en-US"/>
           </a:p>
@@ -4613,7 +4613,7 @@
           <a:p>
             <a:fld id="{73C3BD54-29B9-3D42-B178-776ED395AA85}" type="datetimeFigureOut">
               <a:rPr lang="en-US" smtClean="0"/>
-              <a:t>4/4/2023</a:t>
+              <a:t>4/5/2023</a:t>
             </a:fld>
             <a:endParaRPr lang="en-US"/>
           </a:p>
@@ -4888,7 +4888,7 @@
           <a:p>
             <a:fld id="{73C3BD54-29B9-3D42-B178-776ED395AA85}" type="datetimeFigureOut">
               <a:rPr lang="en-US" smtClean="0"/>
-              <a:t>4/4/2023</a:t>
+              <a:t>4/5/2023</a:t>
             </a:fld>
             <a:endParaRPr lang="en-US"/>
           </a:p>
@@ -5359,7 +5359,7 @@
           <a:p>
             <a:fld id="{73C3BD54-29B9-3D42-B178-776ED395AA85}" type="datetimeFigureOut">
               <a:rPr lang="en-US" smtClean="0"/>
-              <a:t>4/4/2023</a:t>
+              <a:t>4/5/2023</a:t>
             </a:fld>
             <a:endParaRPr lang="en-US"/>
           </a:p>
@@ -5810,7 +5810,7 @@
           <a:p>
             <a:fld id="{73C3BD54-29B9-3D42-B178-776ED395AA85}" type="datetimeFigureOut">
               <a:rPr lang="en-US" smtClean="0"/>
-              <a:t>4/4/2023</a:t>
+              <a:t>4/5/2023</a:t>
             </a:fld>
             <a:endParaRPr lang="en-US"/>
           </a:p>
@@ -6209,7 +6209,7 @@
             <a:fld id="{73C3BD54-29B9-3D42-B178-776ED395AA85}" type="datetimeFigureOut">
               <a:rPr lang="en-US" smtClean="0"/>
               <a:pPr/>
-              <a:t>4/4/2023</a:t>
+              <a:t>4/5/2023</a:t>
             </a:fld>
             <a:endParaRPr lang="en-US" dirty="0"/>
           </a:p>
@@ -15091,10 +15091,10 @@
       </p:pic>
       <p:pic>
         <p:nvPicPr>
-          <p:cNvPr id="7" name="Immagine 6" descr="Immagine che contiene diagramma&#10;&#10;Descrizione generata automaticamente">
-            <a:extLst>
-              <a:ext uri="{FF2B5EF4-FFF2-40B4-BE49-F238E27FC236}">
-                <a16:creationId xmlns:a16="http://schemas.microsoft.com/office/drawing/2014/main" id="{770B2836-2165-89DA-20B0-0BF780EFDFAD}"/>
+          <p:cNvPr id="3" name="Immagine 2" descr="Immagine che contiene diagramma&#10;&#10;Descrizione generata automaticamente">
+            <a:extLst>
+              <a:ext uri="{FF2B5EF4-FFF2-40B4-BE49-F238E27FC236}">
+                <a16:creationId xmlns:a16="http://schemas.microsoft.com/office/drawing/2014/main" id="{97C9A0A6-ADE6-444D-14D6-8493D9A78B0B}"/>
               </a:ext>
             </a:extLst>
           </p:cNvPr>
@@ -15103,15 +15103,16 @@
           </p:cNvPicPr>
           <p:nvPr/>
         </p:nvPicPr>
-        <p:blipFill rotWithShape="1">
+        <p:blipFill>
           <a:blip r:embed="rId3"/>
-          <a:srcRect b="36701"/>
-          <a:stretch/>
+          <a:stretch>
+            <a:fillRect/>
+          </a:stretch>
         </p:blipFill>
         <p:spPr>
           <a:xfrm>
-            <a:off x="819663" y="1287039"/>
-            <a:ext cx="9660768" cy="4584261"/>
+            <a:off x="2296505" y="1113098"/>
+            <a:ext cx="6668431" cy="5363323"/>
           </a:xfrm>
           <a:prstGeom prst="rect">
             <a:avLst/>
@@ -15262,10 +15263,10 @@
       </p:pic>
       <p:pic>
         <p:nvPicPr>
-          <p:cNvPr id="2" name="Immagine 1">
-            <a:extLst>
-              <a:ext uri="{FF2B5EF4-FFF2-40B4-BE49-F238E27FC236}">
-                <a16:creationId xmlns:a16="http://schemas.microsoft.com/office/drawing/2014/main" id="{4504122B-0E78-FF80-8EE5-33A92F01D590}"/>
+          <p:cNvPr id="4" name="Immagine 3" descr="Immagine che contiene diagramma&#10;&#10;Descrizione generata automaticamente">
+            <a:extLst>
+              <a:ext uri="{FF2B5EF4-FFF2-40B4-BE49-F238E27FC236}">
+                <a16:creationId xmlns:a16="http://schemas.microsoft.com/office/drawing/2014/main" id="{E2CD93AB-5022-3238-4686-1486B87EE6CA}"/>
               </a:ext>
             </a:extLst>
           </p:cNvPr>
@@ -15282,8 +15283,8 @@
         </p:blipFill>
         <p:spPr>
           <a:xfrm>
-            <a:off x="1605041" y="1874384"/>
-            <a:ext cx="8539065" cy="3626080"/>
+            <a:off x="2310953" y="1122403"/>
+            <a:ext cx="6754168" cy="5372850"/>
           </a:xfrm>
           <a:prstGeom prst="rect">
             <a:avLst/>
@@ -15432,12 +15433,371 @@
           </a:prstGeom>
         </p:spPr>
       </p:pic>
+      <p:sp>
+        <p:nvSpPr>
+          <p:cNvPr id="4" name="CasellaDiTesto 3">
+            <a:extLst>
+              <a:ext uri="{FF2B5EF4-FFF2-40B4-BE49-F238E27FC236}">
+                <a16:creationId xmlns:a16="http://schemas.microsoft.com/office/drawing/2014/main" id="{D96613ED-0EF6-435E-4DBA-E73CA4466CA8}"/>
+              </a:ext>
+            </a:extLst>
+          </p:cNvPr>
+          <p:cNvSpPr txBox="1"/>
+          <p:nvPr/>
+        </p:nvSpPr>
+        <p:spPr>
+          <a:xfrm>
+            <a:off x="1055077" y="3629465"/>
+            <a:ext cx="10480431" cy="1554272"/>
+          </a:xfrm>
+          <a:prstGeom prst="rect">
+            <a:avLst/>
+          </a:prstGeom>
+          <a:noFill/>
+        </p:spPr>
+        <p:txBody>
+          <a:bodyPr wrap="square" rtlCol="0">
+            <a:spAutoFit/>
+          </a:bodyPr>
+          <a:lstStyle/>
+          <a:p>
+            <a:r>
+              <a:rPr lang="it-IT" sz="1900" dirty="0"/>
+              <a:t>-</a:t>
+            </a:r>
+            <a:r>
+              <a:rPr lang="it-IT" sz="1900" dirty="0" err="1"/>
+              <a:t>It</a:t>
+            </a:r>
+            <a:r>
+              <a:rPr lang="it-IT" sz="1900" dirty="0"/>
+              <a:t> </a:t>
+            </a:r>
+            <a:r>
+              <a:rPr lang="it-IT" sz="1900" dirty="0" err="1"/>
+              <a:t>is</a:t>
+            </a:r>
+            <a:r>
+              <a:rPr lang="it-IT" sz="1900" dirty="0"/>
+              <a:t> </a:t>
+            </a:r>
+            <a:r>
+              <a:rPr lang="it-IT" sz="1900" dirty="0" err="1"/>
+              <a:t>important</a:t>
+            </a:r>
+            <a:r>
+              <a:rPr lang="it-IT" sz="1900" dirty="0"/>
+              <a:t> to check </a:t>
+            </a:r>
+            <a:r>
+              <a:rPr lang="it-IT" sz="1900" dirty="0" err="1"/>
+              <a:t>whether</a:t>
+            </a:r>
+            <a:r>
+              <a:rPr lang="it-IT" sz="1900" dirty="0"/>
+              <a:t> </a:t>
+            </a:r>
+            <a:r>
+              <a:rPr lang="it-IT" sz="1900" dirty="0" err="1"/>
+              <a:t>considering</a:t>
+            </a:r>
+            <a:r>
+              <a:rPr lang="it-IT" sz="1900" dirty="0"/>
+              <a:t> the last frame of the </a:t>
+            </a:r>
+            <a:r>
+              <a:rPr lang="it-IT" sz="1900" dirty="0" err="1"/>
+              <a:t>segment</a:t>
+            </a:r>
+            <a:r>
+              <a:rPr lang="it-IT" sz="1900" dirty="0"/>
+              <a:t> or </a:t>
+            </a:r>
+            <a:r>
+              <a:rPr lang="it-IT" sz="1900" dirty="0" err="1"/>
+              <a:t>not</a:t>
+            </a:r>
+            <a:r>
+              <a:rPr lang="it-IT" sz="1900" dirty="0"/>
+              <a:t>:</a:t>
+            </a:r>
+          </a:p>
+          <a:p>
+            <a:r>
+              <a:rPr lang="it-IT" sz="1900" dirty="0" err="1"/>
+              <a:t>Usually</a:t>
+            </a:r>
+            <a:r>
+              <a:rPr lang="it-IT" sz="1900" dirty="0"/>
+              <a:t> </a:t>
+            </a:r>
+            <a:r>
+              <a:rPr lang="it-IT" sz="1900" dirty="0" err="1"/>
+              <a:t>what</a:t>
+            </a:r>
+            <a:r>
+              <a:rPr lang="it-IT" sz="1900" dirty="0"/>
+              <a:t> </a:t>
+            </a:r>
+            <a:r>
+              <a:rPr lang="it-IT" sz="1900" dirty="0" err="1"/>
+              <a:t>happens</a:t>
+            </a:r>
+            <a:r>
+              <a:rPr lang="it-IT" sz="1900" dirty="0"/>
+              <a:t> </a:t>
+            </a:r>
+            <a:r>
+              <a:rPr lang="it-IT" sz="1900" dirty="0" err="1"/>
+              <a:t>is</a:t>
+            </a:r>
+            <a:r>
+              <a:rPr lang="it-IT" sz="1900" dirty="0"/>
+              <a:t> </a:t>
+            </a:r>
+            <a:r>
+              <a:rPr lang="it-IT" sz="1900" dirty="0" err="1"/>
+              <a:t>that</a:t>
+            </a:r>
+            <a:r>
+              <a:rPr lang="it-IT" sz="1900" dirty="0"/>
+              <a:t> the </a:t>
+            </a:r>
+            <a:r>
+              <a:rPr lang="it-IT" sz="1900" dirty="0" err="1"/>
+              <a:t>segmnet</a:t>
+            </a:r>
+            <a:r>
+              <a:rPr lang="it-IT" sz="1900" dirty="0"/>
+              <a:t> </a:t>
+            </a:r>
+            <a:r>
+              <a:rPr lang="it-IT" sz="1900" dirty="0" err="1"/>
+              <a:t>is</a:t>
+            </a:r>
+            <a:r>
+              <a:rPr lang="it-IT" sz="1900" dirty="0"/>
+              <a:t> </a:t>
+            </a:r>
+            <a:r>
+              <a:rPr lang="it-IT" sz="1900" dirty="0" err="1"/>
+              <a:t>not</a:t>
+            </a:r>
+            <a:r>
+              <a:rPr lang="it-IT" sz="1900" dirty="0"/>
+              <a:t> an </a:t>
+            </a:r>
+            <a:r>
+              <a:rPr lang="it-IT" sz="1900" dirty="0" err="1"/>
+              <a:t>exact</a:t>
+            </a:r>
+            <a:r>
+              <a:rPr lang="it-IT" sz="1900" dirty="0"/>
+              <a:t> multiple of a frame size(4096 BYTES). </a:t>
+            </a:r>
+          </a:p>
+          <a:p>
+            <a:r>
+              <a:rPr lang="it-IT" sz="1900" dirty="0" err="1"/>
+              <a:t>It</a:t>
+            </a:r>
+            <a:r>
+              <a:rPr lang="it-IT" sz="1900" dirty="0"/>
+              <a:t> </a:t>
+            </a:r>
+            <a:r>
+              <a:rPr lang="it-IT" sz="1900" dirty="0" err="1"/>
+              <a:t>means</a:t>
+            </a:r>
+            <a:r>
+              <a:rPr lang="it-IT" sz="1900" dirty="0"/>
+              <a:t> </a:t>
+            </a:r>
+            <a:r>
+              <a:rPr lang="it-IT" sz="1900" dirty="0" err="1"/>
+              <a:t>that</a:t>
+            </a:r>
+            <a:r>
+              <a:rPr lang="it-IT" sz="1900" dirty="0"/>
+              <a:t> </a:t>
+            </a:r>
+            <a:r>
+              <a:rPr lang="it-IT" sz="1900" dirty="0" err="1"/>
+              <a:t>implementing</a:t>
+            </a:r>
+            <a:r>
+              <a:rPr lang="it-IT" sz="1900" dirty="0"/>
+              <a:t> DEMAND </a:t>
+            </a:r>
+            <a:r>
+              <a:rPr lang="it-IT" sz="1900" dirty="0" err="1"/>
+              <a:t>PAGING,so</a:t>
+            </a:r>
+            <a:r>
+              <a:rPr lang="it-IT" sz="1900" dirty="0"/>
+              <a:t> </a:t>
+            </a:r>
+            <a:r>
+              <a:rPr lang="it-IT" sz="1900" dirty="0" err="1"/>
+              <a:t>selecting</a:t>
+            </a:r>
+            <a:r>
+              <a:rPr lang="it-IT" sz="1900" dirty="0"/>
+              <a:t> </a:t>
+            </a:r>
+            <a:r>
+              <a:rPr lang="it-IT" sz="1900" dirty="0" err="1"/>
+              <a:t>only</a:t>
+            </a:r>
+            <a:r>
+              <a:rPr lang="it-IT" sz="1900" dirty="0"/>
+              <a:t> a page </a:t>
+            </a:r>
+            <a:r>
+              <a:rPr lang="it-IT" sz="1900" dirty="0" err="1"/>
+              <a:t>each</a:t>
+            </a:r>
+            <a:r>
+              <a:rPr lang="it-IT" sz="1900" dirty="0"/>
+              <a:t> </a:t>
+            </a:r>
+            <a:r>
+              <a:rPr lang="it-IT" sz="1900" dirty="0" err="1"/>
+              <a:t>time,the</a:t>
+            </a:r>
+            <a:r>
+              <a:rPr lang="it-IT" sz="1900" dirty="0"/>
+              <a:t> last page of a </a:t>
+            </a:r>
+            <a:r>
+              <a:rPr lang="it-IT" sz="1900" dirty="0" err="1"/>
+              <a:t>segment</a:t>
+            </a:r>
+            <a:r>
+              <a:rPr lang="it-IT" sz="1900" dirty="0"/>
+              <a:t> </a:t>
+            </a:r>
+            <a:r>
+              <a:rPr lang="it-IT" sz="1900" dirty="0" err="1"/>
+              <a:t>will</a:t>
+            </a:r>
+            <a:r>
+              <a:rPr lang="it-IT" sz="1900" dirty="0"/>
+              <a:t> </a:t>
+            </a:r>
+            <a:r>
+              <a:rPr lang="it-IT" sz="1900" dirty="0" err="1"/>
+              <a:t>have</a:t>
+            </a:r>
+            <a:r>
+              <a:rPr lang="it-IT" sz="1900" dirty="0"/>
+              <a:t> </a:t>
+            </a:r>
+            <a:r>
+              <a:rPr lang="it-IT" sz="1900" dirty="0" err="1"/>
+              <a:t>surely</a:t>
+            </a:r>
+            <a:r>
+              <a:rPr lang="it-IT" sz="1900" dirty="0"/>
+              <a:t> a </a:t>
+            </a:r>
+            <a:r>
+              <a:rPr lang="it-IT" sz="1900" dirty="0" err="1"/>
+              <a:t>dimension</a:t>
+            </a:r>
+            <a:r>
+              <a:rPr lang="it-IT" sz="1900" dirty="0"/>
+              <a:t> </a:t>
+            </a:r>
+            <a:r>
+              <a:rPr lang="it-IT" sz="1900" dirty="0" err="1"/>
+              <a:t>lower</a:t>
+            </a:r>
+            <a:r>
+              <a:rPr lang="it-IT" sz="1900" dirty="0"/>
+              <a:t> </a:t>
+            </a:r>
+            <a:r>
+              <a:rPr lang="it-IT" sz="1900" dirty="0" err="1"/>
+              <a:t>than</a:t>
+            </a:r>
+            <a:r>
+              <a:rPr lang="it-IT" sz="1900" dirty="0"/>
+              <a:t> 4096 BYTES and </a:t>
+            </a:r>
+            <a:r>
+              <a:rPr lang="it-IT" sz="1900" dirty="0" err="1"/>
+              <a:t>it</a:t>
+            </a:r>
+            <a:r>
+              <a:rPr lang="it-IT" sz="1900" dirty="0"/>
+              <a:t> must be </a:t>
+            </a:r>
+            <a:r>
+              <a:rPr lang="it-IT" sz="1900" dirty="0" err="1"/>
+              <a:t>guaranteed</a:t>
+            </a:r>
+            <a:r>
+              <a:rPr lang="it-IT" sz="1900" dirty="0"/>
+              <a:t> to upload </a:t>
+            </a:r>
+            <a:r>
+              <a:rPr lang="it-IT" sz="1900" dirty="0" err="1"/>
+              <a:t>exactly</a:t>
+            </a:r>
+            <a:r>
+              <a:rPr lang="it-IT" sz="1900" dirty="0"/>
+              <a:t> </a:t>
+            </a:r>
+            <a:r>
+              <a:rPr lang="it-IT" sz="1900" dirty="0" err="1"/>
+              <a:t>that</a:t>
+            </a:r>
+            <a:r>
+              <a:rPr lang="it-IT" sz="1900" dirty="0"/>
+              <a:t> </a:t>
+            </a:r>
+            <a:r>
+              <a:rPr lang="it-IT" sz="1900" dirty="0" err="1"/>
+              <a:t>dimension</a:t>
+            </a:r>
+            <a:r>
+              <a:rPr lang="it-IT" sz="1900" dirty="0"/>
+              <a:t> in </a:t>
+            </a:r>
+            <a:r>
+              <a:rPr lang="it-IT" sz="1900" dirty="0" err="1"/>
+              <a:t>order</a:t>
+            </a:r>
+            <a:r>
+              <a:rPr lang="it-IT" sz="1900" dirty="0"/>
+              <a:t> to </a:t>
+            </a:r>
+            <a:r>
+              <a:rPr lang="it-IT" sz="1900" dirty="0" err="1"/>
+              <a:t>not</a:t>
+            </a:r>
+            <a:r>
+              <a:rPr lang="it-IT" sz="1900" dirty="0"/>
+              <a:t> </a:t>
+            </a:r>
+            <a:r>
+              <a:rPr lang="it-IT" sz="1900" dirty="0" err="1"/>
+              <a:t>let</a:t>
+            </a:r>
+            <a:r>
+              <a:rPr lang="it-IT" sz="1900" dirty="0"/>
+              <a:t> the system crash.</a:t>
+            </a:r>
+          </a:p>
+        </p:txBody>
+      </p:sp>
       <p:pic>
         <p:nvPicPr>
-          <p:cNvPr id="3" name="Immagine 2" descr="Immagine che contiene testo&#10;&#10;Descrizione generata automaticamente">
-            <a:extLst>
-              <a:ext uri="{FF2B5EF4-FFF2-40B4-BE49-F238E27FC236}">
-                <a16:creationId xmlns:a16="http://schemas.microsoft.com/office/drawing/2014/main" id="{DBBA7199-C60C-BE5D-08C5-895371160B2A}"/>
+          <p:cNvPr id="5" name="Immagine 4" descr="Immagine che contiene testo&#10;&#10;Descrizione generata automaticamente">
+            <a:extLst>
+              <a:ext uri="{FF2B5EF4-FFF2-40B4-BE49-F238E27FC236}">
+                <a16:creationId xmlns:a16="http://schemas.microsoft.com/office/drawing/2014/main" id="{44D104BD-63FD-2CC1-1674-CDF3FF8F7285}"/>
               </a:ext>
             </a:extLst>
           </p:cNvPr>
@@ -15454,373 +15814,14 @@
         </p:blipFill>
         <p:spPr>
           <a:xfrm>
-            <a:off x="791529" y="1389185"/>
-            <a:ext cx="9491956" cy="1872117"/>
+            <a:off x="1055077" y="1454731"/>
+            <a:ext cx="9369083" cy="1900491"/>
           </a:xfrm>
           <a:prstGeom prst="rect">
             <a:avLst/>
           </a:prstGeom>
         </p:spPr>
       </p:pic>
-      <p:sp>
-        <p:nvSpPr>
-          <p:cNvPr id="4" name="CasellaDiTesto 3">
-            <a:extLst>
-              <a:ext uri="{FF2B5EF4-FFF2-40B4-BE49-F238E27FC236}">
-                <a16:creationId xmlns:a16="http://schemas.microsoft.com/office/drawing/2014/main" id="{D96613ED-0EF6-435E-4DBA-E73CA4466CA8}"/>
-              </a:ext>
-            </a:extLst>
-          </p:cNvPr>
-          <p:cNvSpPr txBox="1"/>
-          <p:nvPr/>
-        </p:nvSpPr>
-        <p:spPr>
-          <a:xfrm>
-            <a:off x="1055077" y="3629465"/>
-            <a:ext cx="10480431" cy="1554272"/>
-          </a:xfrm>
-          <a:prstGeom prst="rect">
-            <a:avLst/>
-          </a:prstGeom>
-          <a:noFill/>
-        </p:spPr>
-        <p:txBody>
-          <a:bodyPr wrap="square" rtlCol="0">
-            <a:spAutoFit/>
-          </a:bodyPr>
-          <a:lstStyle/>
-          <a:p>
-            <a:r>
-              <a:rPr lang="it-IT" sz="1900" dirty="0"/>
-              <a:t>-</a:t>
-            </a:r>
-            <a:r>
-              <a:rPr lang="it-IT" sz="1900" dirty="0" err="1"/>
-              <a:t>It</a:t>
-            </a:r>
-            <a:r>
-              <a:rPr lang="it-IT" sz="1900" dirty="0"/>
-              <a:t> </a:t>
-            </a:r>
-            <a:r>
-              <a:rPr lang="it-IT" sz="1900" dirty="0" err="1"/>
-              <a:t>is</a:t>
-            </a:r>
-            <a:r>
-              <a:rPr lang="it-IT" sz="1900" dirty="0"/>
-              <a:t> </a:t>
-            </a:r>
-            <a:r>
-              <a:rPr lang="it-IT" sz="1900" dirty="0" err="1"/>
-              <a:t>important</a:t>
-            </a:r>
-            <a:r>
-              <a:rPr lang="it-IT" sz="1900" dirty="0"/>
-              <a:t> to check </a:t>
-            </a:r>
-            <a:r>
-              <a:rPr lang="it-IT" sz="1900" dirty="0" err="1"/>
-              <a:t>whether</a:t>
-            </a:r>
-            <a:r>
-              <a:rPr lang="it-IT" sz="1900" dirty="0"/>
-              <a:t> </a:t>
-            </a:r>
-            <a:r>
-              <a:rPr lang="it-IT" sz="1900" dirty="0" err="1"/>
-              <a:t>considering</a:t>
-            </a:r>
-            <a:r>
-              <a:rPr lang="it-IT" sz="1900" dirty="0"/>
-              <a:t> the last frame of the </a:t>
-            </a:r>
-            <a:r>
-              <a:rPr lang="it-IT" sz="1900" dirty="0" err="1"/>
-              <a:t>segment</a:t>
-            </a:r>
-            <a:r>
-              <a:rPr lang="it-IT" sz="1900" dirty="0"/>
-              <a:t> or </a:t>
-            </a:r>
-            <a:r>
-              <a:rPr lang="it-IT" sz="1900" dirty="0" err="1"/>
-              <a:t>not</a:t>
-            </a:r>
-            <a:r>
-              <a:rPr lang="it-IT" sz="1900" dirty="0"/>
-              <a:t>:</a:t>
-            </a:r>
-          </a:p>
-          <a:p>
-            <a:r>
-              <a:rPr lang="it-IT" sz="1900" dirty="0" err="1"/>
-              <a:t>Usually</a:t>
-            </a:r>
-            <a:r>
-              <a:rPr lang="it-IT" sz="1900" dirty="0"/>
-              <a:t> </a:t>
-            </a:r>
-            <a:r>
-              <a:rPr lang="it-IT" sz="1900" dirty="0" err="1"/>
-              <a:t>what</a:t>
-            </a:r>
-            <a:r>
-              <a:rPr lang="it-IT" sz="1900" dirty="0"/>
-              <a:t> </a:t>
-            </a:r>
-            <a:r>
-              <a:rPr lang="it-IT" sz="1900" dirty="0" err="1"/>
-              <a:t>happens</a:t>
-            </a:r>
-            <a:r>
-              <a:rPr lang="it-IT" sz="1900" dirty="0"/>
-              <a:t> </a:t>
-            </a:r>
-            <a:r>
-              <a:rPr lang="it-IT" sz="1900" dirty="0" err="1"/>
-              <a:t>is</a:t>
-            </a:r>
-            <a:r>
-              <a:rPr lang="it-IT" sz="1900" dirty="0"/>
-              <a:t> </a:t>
-            </a:r>
-            <a:r>
-              <a:rPr lang="it-IT" sz="1900" dirty="0" err="1"/>
-              <a:t>that</a:t>
-            </a:r>
-            <a:r>
-              <a:rPr lang="it-IT" sz="1900" dirty="0"/>
-              <a:t> the </a:t>
-            </a:r>
-            <a:r>
-              <a:rPr lang="it-IT" sz="1900" dirty="0" err="1"/>
-              <a:t>segmnet</a:t>
-            </a:r>
-            <a:r>
-              <a:rPr lang="it-IT" sz="1900" dirty="0"/>
-              <a:t> </a:t>
-            </a:r>
-            <a:r>
-              <a:rPr lang="it-IT" sz="1900" dirty="0" err="1"/>
-              <a:t>is</a:t>
-            </a:r>
-            <a:r>
-              <a:rPr lang="it-IT" sz="1900" dirty="0"/>
-              <a:t> </a:t>
-            </a:r>
-            <a:r>
-              <a:rPr lang="it-IT" sz="1900" dirty="0" err="1"/>
-              <a:t>not</a:t>
-            </a:r>
-            <a:r>
-              <a:rPr lang="it-IT" sz="1900" dirty="0"/>
-              <a:t> an </a:t>
-            </a:r>
-            <a:r>
-              <a:rPr lang="it-IT" sz="1900" dirty="0" err="1"/>
-              <a:t>exact</a:t>
-            </a:r>
-            <a:r>
-              <a:rPr lang="it-IT" sz="1900" dirty="0"/>
-              <a:t> multiple of a frame size(4096 BYTES). </a:t>
-            </a:r>
-          </a:p>
-          <a:p>
-            <a:r>
-              <a:rPr lang="it-IT" sz="1900" dirty="0" err="1"/>
-              <a:t>It</a:t>
-            </a:r>
-            <a:r>
-              <a:rPr lang="it-IT" sz="1900" dirty="0"/>
-              <a:t> </a:t>
-            </a:r>
-            <a:r>
-              <a:rPr lang="it-IT" sz="1900" dirty="0" err="1"/>
-              <a:t>means</a:t>
-            </a:r>
-            <a:r>
-              <a:rPr lang="it-IT" sz="1900" dirty="0"/>
-              <a:t> </a:t>
-            </a:r>
-            <a:r>
-              <a:rPr lang="it-IT" sz="1900" dirty="0" err="1"/>
-              <a:t>that</a:t>
-            </a:r>
-            <a:r>
-              <a:rPr lang="it-IT" sz="1900" dirty="0"/>
-              <a:t> </a:t>
-            </a:r>
-            <a:r>
-              <a:rPr lang="it-IT" sz="1900" dirty="0" err="1"/>
-              <a:t>implementing</a:t>
-            </a:r>
-            <a:r>
-              <a:rPr lang="it-IT" sz="1900" dirty="0"/>
-              <a:t> DEMAND </a:t>
-            </a:r>
-            <a:r>
-              <a:rPr lang="it-IT" sz="1900" dirty="0" err="1"/>
-              <a:t>PAGING,so</a:t>
-            </a:r>
-            <a:r>
-              <a:rPr lang="it-IT" sz="1900" dirty="0"/>
-              <a:t> </a:t>
-            </a:r>
-            <a:r>
-              <a:rPr lang="it-IT" sz="1900" dirty="0" err="1"/>
-              <a:t>selecting</a:t>
-            </a:r>
-            <a:r>
-              <a:rPr lang="it-IT" sz="1900" dirty="0"/>
-              <a:t> </a:t>
-            </a:r>
-            <a:r>
-              <a:rPr lang="it-IT" sz="1900" dirty="0" err="1"/>
-              <a:t>only</a:t>
-            </a:r>
-            <a:r>
-              <a:rPr lang="it-IT" sz="1900" dirty="0"/>
-              <a:t> a page </a:t>
-            </a:r>
-            <a:r>
-              <a:rPr lang="it-IT" sz="1900" dirty="0" err="1"/>
-              <a:t>each</a:t>
-            </a:r>
-            <a:r>
-              <a:rPr lang="it-IT" sz="1900" dirty="0"/>
-              <a:t> </a:t>
-            </a:r>
-            <a:r>
-              <a:rPr lang="it-IT" sz="1900" dirty="0" err="1"/>
-              <a:t>time,the</a:t>
-            </a:r>
-            <a:r>
-              <a:rPr lang="it-IT" sz="1900" dirty="0"/>
-              <a:t> last page of a </a:t>
-            </a:r>
-            <a:r>
-              <a:rPr lang="it-IT" sz="1900" dirty="0" err="1"/>
-              <a:t>segment</a:t>
-            </a:r>
-            <a:r>
-              <a:rPr lang="it-IT" sz="1900" dirty="0"/>
-              <a:t> </a:t>
-            </a:r>
-            <a:r>
-              <a:rPr lang="it-IT" sz="1900" dirty="0" err="1"/>
-              <a:t>will</a:t>
-            </a:r>
-            <a:r>
-              <a:rPr lang="it-IT" sz="1900" dirty="0"/>
-              <a:t> </a:t>
-            </a:r>
-            <a:r>
-              <a:rPr lang="it-IT" sz="1900" dirty="0" err="1"/>
-              <a:t>have</a:t>
-            </a:r>
-            <a:r>
-              <a:rPr lang="it-IT" sz="1900" dirty="0"/>
-              <a:t> </a:t>
-            </a:r>
-            <a:r>
-              <a:rPr lang="it-IT" sz="1900" dirty="0" err="1"/>
-              <a:t>surely</a:t>
-            </a:r>
-            <a:r>
-              <a:rPr lang="it-IT" sz="1900" dirty="0"/>
-              <a:t> a </a:t>
-            </a:r>
-            <a:r>
-              <a:rPr lang="it-IT" sz="1900" dirty="0" err="1"/>
-              <a:t>dimension</a:t>
-            </a:r>
-            <a:r>
-              <a:rPr lang="it-IT" sz="1900" dirty="0"/>
-              <a:t> </a:t>
-            </a:r>
-            <a:r>
-              <a:rPr lang="it-IT" sz="1900" dirty="0" err="1"/>
-              <a:t>lower</a:t>
-            </a:r>
-            <a:r>
-              <a:rPr lang="it-IT" sz="1900" dirty="0"/>
-              <a:t> </a:t>
-            </a:r>
-            <a:r>
-              <a:rPr lang="it-IT" sz="1900" dirty="0" err="1"/>
-              <a:t>than</a:t>
-            </a:r>
-            <a:r>
-              <a:rPr lang="it-IT" sz="1900" dirty="0"/>
-              <a:t> 4096 BYTES and </a:t>
-            </a:r>
-            <a:r>
-              <a:rPr lang="it-IT" sz="1900" dirty="0" err="1"/>
-              <a:t>it</a:t>
-            </a:r>
-            <a:r>
-              <a:rPr lang="it-IT" sz="1900" dirty="0"/>
-              <a:t> must be </a:t>
-            </a:r>
-            <a:r>
-              <a:rPr lang="it-IT" sz="1900" dirty="0" err="1"/>
-              <a:t>guaranteed</a:t>
-            </a:r>
-            <a:r>
-              <a:rPr lang="it-IT" sz="1900" dirty="0"/>
-              <a:t> to upload </a:t>
-            </a:r>
-            <a:r>
-              <a:rPr lang="it-IT" sz="1900" dirty="0" err="1"/>
-              <a:t>exactly</a:t>
-            </a:r>
-            <a:r>
-              <a:rPr lang="it-IT" sz="1900" dirty="0"/>
-              <a:t> </a:t>
-            </a:r>
-            <a:r>
-              <a:rPr lang="it-IT" sz="1900" dirty="0" err="1"/>
-              <a:t>that</a:t>
-            </a:r>
-            <a:r>
-              <a:rPr lang="it-IT" sz="1900" dirty="0"/>
-              <a:t> </a:t>
-            </a:r>
-            <a:r>
-              <a:rPr lang="it-IT" sz="1900" dirty="0" err="1"/>
-              <a:t>dimension</a:t>
-            </a:r>
-            <a:r>
-              <a:rPr lang="it-IT" sz="1900" dirty="0"/>
-              <a:t> in </a:t>
-            </a:r>
-            <a:r>
-              <a:rPr lang="it-IT" sz="1900" dirty="0" err="1"/>
-              <a:t>order</a:t>
-            </a:r>
-            <a:r>
-              <a:rPr lang="it-IT" sz="1900" dirty="0"/>
-              <a:t> to </a:t>
-            </a:r>
-            <a:r>
-              <a:rPr lang="it-IT" sz="1900" dirty="0" err="1"/>
-              <a:t>not</a:t>
-            </a:r>
-            <a:r>
-              <a:rPr lang="it-IT" sz="1900" dirty="0"/>
-              <a:t> </a:t>
-            </a:r>
-            <a:r>
-              <a:rPr lang="it-IT" sz="1900" dirty="0" err="1"/>
-              <a:t>let</a:t>
-            </a:r>
-            <a:r>
-              <a:rPr lang="it-IT" sz="1900" dirty="0"/>
-              <a:t> the system crash.</a:t>
-            </a:r>
-          </a:p>
-        </p:txBody>
-      </p:sp>
     </p:spTree>
     <p:extLst>
       <p:ext uri="{BB962C8B-B14F-4D97-AF65-F5344CB8AC3E}">
@@ -15965,10 +15966,10 @@
       </p:pic>
       <p:pic>
         <p:nvPicPr>
-          <p:cNvPr id="12" name="Immagine 11" descr="Immagine che contiene diagramma&#10;&#10;Descrizione generata automaticamente">
-            <a:extLst>
-              <a:ext uri="{FF2B5EF4-FFF2-40B4-BE49-F238E27FC236}">
-                <a16:creationId xmlns:a16="http://schemas.microsoft.com/office/drawing/2014/main" id="{C36444AB-728C-4FD5-6DE4-1A6D8025D7C0}"/>
+          <p:cNvPr id="3" name="Immagine 2" descr="Immagine che contiene diagramma&#10;&#10;Descrizione generata automaticamente">
+            <a:extLst>
+              <a:ext uri="{FF2B5EF4-FFF2-40B4-BE49-F238E27FC236}">
+                <a16:creationId xmlns:a16="http://schemas.microsoft.com/office/drawing/2014/main" id="{A149C6E2-D156-4B1C-5AAD-B7F70ACEDC24}"/>
               </a:ext>
             </a:extLst>
           </p:cNvPr>
@@ -15985,8 +15986,8 @@
         </p:blipFill>
         <p:spPr>
           <a:xfrm>
-            <a:off x="1799860" y="1287039"/>
-            <a:ext cx="8099583" cy="5063655"/>
+            <a:off x="2111238" y="1533260"/>
+            <a:ext cx="7356319" cy="4286698"/>
           </a:xfrm>
           <a:prstGeom prst="rect">
             <a:avLst/>
@@ -16313,10 +16314,10 @@
       </p:pic>
       <p:pic>
         <p:nvPicPr>
-          <p:cNvPr id="7" name="Immagine 6" descr="Immagine che contiene testo&#10;&#10;Descrizione generata automaticamente">
-            <a:extLst>
-              <a:ext uri="{FF2B5EF4-FFF2-40B4-BE49-F238E27FC236}">
-                <a16:creationId xmlns:a16="http://schemas.microsoft.com/office/drawing/2014/main" id="{541B0D26-EFD9-74ED-A6AF-9DFCBA07E7C8}"/>
+          <p:cNvPr id="3" name="Immagine 2" descr="Immagine che contiene testo, lettera&#10;&#10;Descrizione generata automaticamente">
+            <a:extLst>
+              <a:ext uri="{FF2B5EF4-FFF2-40B4-BE49-F238E27FC236}">
+                <a16:creationId xmlns:a16="http://schemas.microsoft.com/office/drawing/2014/main" id="{25C5414F-39CD-8DF3-6601-68357B8B5471}"/>
               </a:ext>
             </a:extLst>
           </p:cNvPr>
@@ -16333,8 +16334,8 @@
         </p:blipFill>
         <p:spPr>
           <a:xfrm>
-            <a:off x="1240825" y="1507797"/>
-            <a:ext cx="8845709" cy="3907408"/>
+            <a:off x="1094943" y="1395699"/>
+            <a:ext cx="9065437" cy="3851548"/>
           </a:xfrm>
           <a:prstGeom prst="rect">
             <a:avLst/>
@@ -16485,10 +16486,10 @@
       </p:pic>
       <p:pic>
         <p:nvPicPr>
-          <p:cNvPr id="5" name="Immagine 4" descr="Immagine che contiene diagramma&#10;&#10;Descrizione generata automaticamente">
-            <a:extLst>
-              <a:ext uri="{FF2B5EF4-FFF2-40B4-BE49-F238E27FC236}">
-                <a16:creationId xmlns:a16="http://schemas.microsoft.com/office/drawing/2014/main" id="{B2CAE927-1F8A-EC82-6923-96E0491DE5F6}"/>
+          <p:cNvPr id="3" name="Immagine 2" descr="Immagine che contiene diagramma&#10;&#10;Descrizione generata automaticamente">
+            <a:extLst>
+              <a:ext uri="{FF2B5EF4-FFF2-40B4-BE49-F238E27FC236}">
+                <a16:creationId xmlns:a16="http://schemas.microsoft.com/office/drawing/2014/main" id="{A0215517-1A92-B136-42A2-4651931CDA7B}"/>
               </a:ext>
             </a:extLst>
           </p:cNvPr>
@@ -16505,8 +16506,8 @@
         </p:blipFill>
         <p:spPr>
           <a:xfrm>
-            <a:off x="1265402" y="1318918"/>
-            <a:ext cx="9001497" cy="5640259"/>
+            <a:off x="1792222" y="1287039"/>
+            <a:ext cx="7998891" cy="4705917"/>
           </a:xfrm>
           <a:prstGeom prst="rect">
             <a:avLst/>
@@ -16657,10 +16658,10 @@
       </p:pic>
       <p:pic>
         <p:nvPicPr>
-          <p:cNvPr id="3" name="Immagine 2" descr="Immagine che contiene testo&#10;&#10;Descrizione generata automaticamente">
-            <a:extLst>
-              <a:ext uri="{FF2B5EF4-FFF2-40B4-BE49-F238E27FC236}">
-                <a16:creationId xmlns:a16="http://schemas.microsoft.com/office/drawing/2014/main" id="{27FE2C5F-B2EF-1F93-12B5-9D37B3D4BEE7}"/>
+          <p:cNvPr id="4" name="Immagine 3" descr="Immagine che contiene testo&#10;&#10;Descrizione generata automaticamente">
+            <a:extLst>
+              <a:ext uri="{FF2B5EF4-FFF2-40B4-BE49-F238E27FC236}">
+                <a16:creationId xmlns:a16="http://schemas.microsoft.com/office/drawing/2014/main" id="{315028E9-ED58-6276-AAD6-D76CDAECFDD9}"/>
               </a:ext>
             </a:extLst>
           </p:cNvPr>
@@ -16677,8 +16678,8 @@
         </p:blipFill>
         <p:spPr>
           <a:xfrm>
-            <a:off x="1800174" y="1287039"/>
-            <a:ext cx="6429426" cy="5234814"/>
+            <a:off x="2543987" y="1287039"/>
+            <a:ext cx="6234253" cy="4926457"/>
           </a:xfrm>
           <a:prstGeom prst="rect">
             <a:avLst/>

</xml_diff>